<commit_message>
Adapt project / pptx.
</commit_message>
<xml_diff>
--- a/Klonen von Objekten in Java.pptx
+++ b/Klonen von Objekten in Java.pptx
@@ -2,22 +2,23 @@
 <file path=ppt/presentation.xml><?xml version="1.0" encoding="utf-8"?>
 <p:presentation xmlns:a="http://schemas.openxmlformats.org/drawingml/2006/main" xmlns:r="http://schemas.openxmlformats.org/officeDocument/2006/relationships" xmlns:p="http://schemas.openxmlformats.org/presentationml/2006/main" saveSubsetFonts="1">
   <p:sldMasterIdLst>
-    <p:sldMasterId id="2147483648" r:id="rId1"/>
+    <p:sldMasterId id="2147483672" r:id="rId1"/>
   </p:sldMasterIdLst>
   <p:notesMasterIdLst>
-    <p:notesMasterId r:id="rId12"/>
+    <p:notesMasterId r:id="rId13"/>
   </p:notesMasterIdLst>
   <p:sldIdLst>
     <p:sldId id="256" r:id="rId2"/>
-    <p:sldId id="260" r:id="rId3"/>
-    <p:sldId id="258" r:id="rId4"/>
-    <p:sldId id="257" r:id="rId5"/>
-    <p:sldId id="261" r:id="rId6"/>
-    <p:sldId id="262" r:id="rId7"/>
-    <p:sldId id="263" r:id="rId8"/>
-    <p:sldId id="264" r:id="rId9"/>
+    <p:sldId id="258" r:id="rId3"/>
+    <p:sldId id="257" r:id="rId4"/>
+    <p:sldId id="261" r:id="rId5"/>
+    <p:sldId id="262" r:id="rId6"/>
+    <p:sldId id="263" r:id="rId7"/>
+    <p:sldId id="264" r:id="rId8"/>
+    <p:sldId id="267" r:id="rId9"/>
     <p:sldId id="265" r:id="rId10"/>
     <p:sldId id="266" r:id="rId11"/>
+    <p:sldId id="268" r:id="rId12"/>
   </p:sldIdLst>
   <p:sldSz cx="12192000" cy="6858000"/>
   <p:notesSz cx="6858000" cy="9144000"/>
@@ -118,7 +119,7 @@
   </p:defaultTextStyle>
   <p:extLst>
     <p:ext uri="{EFAFB233-063F-42B5-8137-9DF3F51BA10A}">
-      <p15:sldGuideLst xmlns:p15="http://schemas.microsoft.com/office/powerpoint/2012/main" xmlns=""/>
+      <p15:sldGuideLst xmlns="" xmlns:p15="http://schemas.microsoft.com/office/powerpoint/2012/main"/>
     </p:ext>
   </p:extLst>
 </p:presentation>
@@ -130,6 +131,169 @@
     <p:extLst/>
   </p:cmAuthor>
 </p:cmAuthorLst>
+</file>
+
+<file path=ppt/charts/chart1.xml><?xml version="1.0" encoding="utf-8"?>
+<c:chartSpace xmlns:c="http://schemas.openxmlformats.org/drawingml/2006/chart" xmlns:a="http://schemas.openxmlformats.org/drawingml/2006/main" xmlns:r="http://schemas.openxmlformats.org/officeDocument/2006/relationships">
+  <c:date1904 val="0"/>
+  <c:lang val="de-DE"/>
+  <c:roundedCorners val="0"/>
+  <mc:AlternateContent xmlns:mc="http://schemas.openxmlformats.org/markup-compatibility/2006">
+    <mc:Choice xmlns:c14="http://schemas.microsoft.com/office/drawing/2007/8/2/chart" Requires="c14">
+      <c14:style val="102"/>
+    </mc:Choice>
+    <mc:Fallback>
+      <c:style val="2"/>
+    </mc:Fallback>
+  </mc:AlternateContent>
+  <c:chart>
+    <c:title>
+      <c:tx>
+        <c:rich>
+          <a:bodyPr/>
+          <a:lstStyle/>
+          <a:p>
+            <a:pPr>
+              <a:defRPr/>
+            </a:pPr>
+            <a:r>
+              <a:rPr lang="en-US" dirty="0"/>
+              <a:t>Zeit in Sekunden</a:t>
+            </a:r>
+          </a:p>
+        </c:rich>
+      </c:tx>
+      <c:layout/>
+      <c:overlay val="0"/>
+    </c:title>
+    <c:autoTitleDeleted val="0"/>
+    <c:plotArea>
+      <c:layout/>
+      <c:barChart>
+        <c:barDir val="col"/>
+        <c:grouping val="clustered"/>
+        <c:varyColors val="0"/>
+        <c:ser>
+          <c:idx val="0"/>
+          <c:order val="0"/>
+          <c:tx>
+            <c:strRef>
+              <c:f>Tabelle1!$B$1</c:f>
+              <c:strCache>
+                <c:ptCount val="1"/>
+                <c:pt idx="0">
+                  <c:v>Zeit in Sekunden</c:v>
+                </c:pt>
+              </c:strCache>
+            </c:strRef>
+          </c:tx>
+          <c:invertIfNegative val="0"/>
+          <c:cat>
+            <c:strRef>
+              <c:f>Tabelle1!$A$2:$A$4</c:f>
+              <c:strCache>
+                <c:ptCount val="3"/>
+                <c:pt idx="0">
+                  <c:v>Serialisierung</c:v>
+                </c:pt>
+                <c:pt idx="1">
+                  <c:v>Reflection</c:v>
+                </c:pt>
+                <c:pt idx="2">
+                  <c:v>Copy Constructor</c:v>
+                </c:pt>
+              </c:strCache>
+            </c:strRef>
+          </c:cat>
+          <c:val>
+            <c:numRef>
+              <c:f>Tabelle1!$B$2:$B$4</c:f>
+              <c:numCache>
+                <c:formatCode>General</c:formatCode>
+                <c:ptCount val="3"/>
+                <c:pt idx="0">
+                  <c:v>2.1</c:v>
+                </c:pt>
+                <c:pt idx="1">
+                  <c:v>0.1</c:v>
+                </c:pt>
+                <c:pt idx="2">
+                  <c:v>8.9999999999999993E-3</c:v>
+                </c:pt>
+              </c:numCache>
+            </c:numRef>
+          </c:val>
+        </c:ser>
+        <c:dLbls>
+          <c:showLegendKey val="0"/>
+          <c:showVal val="0"/>
+          <c:showCatName val="0"/>
+          <c:showSerName val="0"/>
+          <c:showPercent val="0"/>
+          <c:showBubbleSize val="0"/>
+        </c:dLbls>
+        <c:gapWidth val="150"/>
+        <c:axId val="74082944"/>
+        <c:axId val="76566912"/>
+      </c:barChart>
+      <c:catAx>
+        <c:axId val="74082944"/>
+        <c:scaling>
+          <c:orientation val="minMax"/>
+        </c:scaling>
+        <c:delete val="0"/>
+        <c:axPos val="b"/>
+        <c:majorTickMark val="out"/>
+        <c:minorTickMark val="none"/>
+        <c:tickLblPos val="nextTo"/>
+        <c:crossAx val="76566912"/>
+        <c:crosses val="autoZero"/>
+        <c:auto val="1"/>
+        <c:lblAlgn val="ctr"/>
+        <c:lblOffset val="100"/>
+        <c:noMultiLvlLbl val="0"/>
+      </c:catAx>
+      <c:valAx>
+        <c:axId val="76566912"/>
+        <c:scaling>
+          <c:orientation val="minMax"/>
+        </c:scaling>
+        <c:delete val="0"/>
+        <c:axPos val="l"/>
+        <c:majorGridlines/>
+        <c:numFmt formatCode="General" sourceLinked="1"/>
+        <c:majorTickMark val="out"/>
+        <c:minorTickMark val="none"/>
+        <c:tickLblPos val="nextTo"/>
+        <c:crossAx val="74082944"/>
+        <c:crosses val="autoZero"/>
+        <c:crossBetween val="between"/>
+        <c:majorUnit val="0.2"/>
+      </c:valAx>
+    </c:plotArea>
+    <c:legend>
+      <c:legendPos val="r"/>
+      <c:layout/>
+      <c:overlay val="0"/>
+    </c:legend>
+    <c:plotVisOnly val="1"/>
+    <c:dispBlanksAs val="gap"/>
+    <c:showDLblsOverMax val="0"/>
+  </c:chart>
+  <c:txPr>
+    <a:bodyPr/>
+    <a:lstStyle/>
+    <a:p>
+      <a:pPr>
+        <a:defRPr sz="1800"/>
+      </a:pPr>
+      <a:endParaRPr lang="de-DE"/>
+    </a:p>
+  </c:txPr>
+  <c:externalData r:id="rId1">
+    <c:autoUpdate val="0"/>
+  </c:externalData>
+</c:chartSpace>
 </file>
 
 <file path=ppt/notesMasters/notesMaster1.xml><?xml version="1.0" encoding="utf-8"?>
@@ -181,7 +345,7 @@
             </a:lvl1pPr>
           </a:lstStyle>
           <a:p>
-            <a:endParaRPr lang="de-DE"/>
+            <a:endParaRPr lang="de-DE" dirty="0"/>
           </a:p>
         </p:txBody>
       </p:sp>
@@ -214,9 +378,9 @@
           <a:p>
             <a:fld id="{0CFF15F8-BE5A-488B-A5ED-6304DD42A9ED}" type="datetimeFigureOut">
               <a:rPr lang="de-DE" smtClean="0"/>
-              <a:t>12.12.2016</a:t>
+              <a:t>13.12.2016</a:t>
             </a:fld>
-            <a:endParaRPr lang="de-DE"/>
+            <a:endParaRPr lang="de-DE" dirty="0"/>
           </a:p>
         </p:txBody>
       </p:sp>
@@ -249,7 +413,7 @@
           <a:bodyPr vert="horz" lIns="91440" tIns="45720" rIns="91440" bIns="45720" rtlCol="0" anchor="ctr"/>
           <a:lstStyle/>
           <a:p>
-            <a:endParaRPr lang="de-DE"/>
+            <a:endParaRPr lang="de-DE" dirty="0"/>
           </a:p>
         </p:txBody>
       </p:sp>
@@ -339,7 +503,7 @@
             </a:lvl1pPr>
           </a:lstStyle>
           <a:p>
-            <a:endParaRPr lang="de-DE"/>
+            <a:endParaRPr lang="de-DE" dirty="0"/>
           </a:p>
         </p:txBody>
       </p:sp>
@@ -374,7 +538,7 @@
               <a:rPr lang="de-DE" smtClean="0"/>
               <a:t>‹Nr.›</a:t>
             </a:fld>
-            <a:endParaRPr lang="de-DE"/>
+            <a:endParaRPr lang="de-DE" dirty="0"/>
           </a:p>
         </p:txBody>
       </p:sp>
@@ -525,7 +689,7 @@
           <a:bodyPr/>
           <a:lstStyle/>
           <a:p>
-            <a:endParaRPr lang="de-DE"/>
+            <a:endParaRPr lang="de-DE" dirty="0"/>
           </a:p>
         </p:txBody>
       </p:sp>
@@ -546,9 +710,9 @@
           <a:p>
             <a:fld id="{D81EF397-D705-4C11-A35D-3F20D3DB9D6E}" type="slidenum">
               <a:rPr lang="de-DE" smtClean="0"/>
-              <a:t>4</a:t>
+              <a:t>3</a:t>
             </a:fld>
-            <a:endParaRPr lang="de-DE"/>
+            <a:endParaRPr lang="de-DE" dirty="0"/>
           </a:p>
         </p:txBody>
       </p:sp>
@@ -594,22 +758,19 @@
         </p:nvSpPr>
         <p:spPr>
           <a:xfrm>
-            <a:off x="1524000" y="1122363"/>
-            <a:ext cx="9144000" cy="2387600"/>
+            <a:off x="914400" y="2130430"/>
+            <a:ext cx="10363200" cy="1470025"/>
           </a:xfrm>
         </p:spPr>
         <p:txBody>
-          <a:bodyPr anchor="b"/>
-          <a:lstStyle>
-            <a:lvl1pPr algn="ctr">
-              <a:defRPr sz="6000"/>
-            </a:lvl1pPr>
-          </a:lstStyle>
-          <a:p>
-            <a:r>
-              <a:rPr lang="de-DE"/>
+          <a:bodyPr/>
+          <a:lstStyle/>
+          <a:p>
+            <a:r>
+              <a:rPr lang="de-DE" smtClean="0"/>
               <a:t>Titelmasterformat durch Klicken bearbeiten</a:t>
             </a:r>
+            <a:endParaRPr lang="de-DE"/>
           </a:p>
         </p:txBody>
       </p:sp>
@@ -625,8 +786,8 @@
         </p:nvSpPr>
         <p:spPr>
           <a:xfrm>
-            <a:off x="1524000" y="3602038"/>
-            <a:ext cx="9144000" cy="1655762"/>
+            <a:off x="1828800" y="3886200"/>
+            <a:ext cx="8534400" cy="1752600"/>
           </a:xfrm>
         </p:spPr>
         <p:txBody>
@@ -634,46 +795,101 @@
           <a:lstStyle>
             <a:lvl1pPr marL="0" indent="0" algn="ctr">
               <a:buNone/>
-              <a:defRPr sz="2400"/>
+              <a:defRPr>
+                <a:solidFill>
+                  <a:schemeClr val="tx1">
+                    <a:tint val="75000"/>
+                  </a:schemeClr>
+                </a:solidFill>
+              </a:defRPr>
             </a:lvl1pPr>
             <a:lvl2pPr marL="457200" indent="0" algn="ctr">
               <a:buNone/>
-              <a:defRPr sz="2000"/>
+              <a:defRPr>
+                <a:solidFill>
+                  <a:schemeClr val="tx1">
+                    <a:tint val="75000"/>
+                  </a:schemeClr>
+                </a:solidFill>
+              </a:defRPr>
             </a:lvl2pPr>
             <a:lvl3pPr marL="914400" indent="0" algn="ctr">
               <a:buNone/>
-              <a:defRPr sz="1800"/>
+              <a:defRPr>
+                <a:solidFill>
+                  <a:schemeClr val="tx1">
+                    <a:tint val="75000"/>
+                  </a:schemeClr>
+                </a:solidFill>
+              </a:defRPr>
             </a:lvl3pPr>
             <a:lvl4pPr marL="1371600" indent="0" algn="ctr">
               <a:buNone/>
-              <a:defRPr sz="1600"/>
+              <a:defRPr>
+                <a:solidFill>
+                  <a:schemeClr val="tx1">
+                    <a:tint val="75000"/>
+                  </a:schemeClr>
+                </a:solidFill>
+              </a:defRPr>
             </a:lvl4pPr>
             <a:lvl5pPr marL="1828800" indent="0" algn="ctr">
               <a:buNone/>
-              <a:defRPr sz="1600"/>
+              <a:defRPr>
+                <a:solidFill>
+                  <a:schemeClr val="tx1">
+                    <a:tint val="75000"/>
+                  </a:schemeClr>
+                </a:solidFill>
+              </a:defRPr>
             </a:lvl5pPr>
             <a:lvl6pPr marL="2286000" indent="0" algn="ctr">
               <a:buNone/>
-              <a:defRPr sz="1600"/>
+              <a:defRPr>
+                <a:solidFill>
+                  <a:schemeClr val="tx1">
+                    <a:tint val="75000"/>
+                  </a:schemeClr>
+                </a:solidFill>
+              </a:defRPr>
             </a:lvl6pPr>
             <a:lvl7pPr marL="2743200" indent="0" algn="ctr">
               <a:buNone/>
-              <a:defRPr sz="1600"/>
+              <a:defRPr>
+                <a:solidFill>
+                  <a:schemeClr val="tx1">
+                    <a:tint val="75000"/>
+                  </a:schemeClr>
+                </a:solidFill>
+              </a:defRPr>
             </a:lvl7pPr>
             <a:lvl8pPr marL="3200400" indent="0" algn="ctr">
               <a:buNone/>
-              <a:defRPr sz="1600"/>
+              <a:defRPr>
+                <a:solidFill>
+                  <a:schemeClr val="tx1">
+                    <a:tint val="75000"/>
+                  </a:schemeClr>
+                </a:solidFill>
+              </a:defRPr>
             </a:lvl8pPr>
             <a:lvl9pPr marL="3657600" indent="0" algn="ctr">
               <a:buNone/>
-              <a:defRPr sz="1600"/>
+              <a:defRPr>
+                <a:solidFill>
+                  <a:schemeClr val="tx1">
+                    <a:tint val="75000"/>
+                  </a:schemeClr>
+                </a:solidFill>
+              </a:defRPr>
             </a:lvl9pPr>
           </a:lstStyle>
           <a:p>
             <a:r>
-              <a:rPr lang="de-DE"/>
+              <a:rPr lang="de-DE" smtClean="0"/>
               <a:t>Formatvorlage des Untertitelmasters durch Klicken bearbeiten</a:t>
             </a:r>
+            <a:endParaRPr lang="de-DE"/>
           </a:p>
         </p:txBody>
       </p:sp>
@@ -694,9 +910,9 @@
           <a:p>
             <a:fld id="{88350639-16E7-402A-85F7-0DBCD150AD57}" type="datetimeFigureOut">
               <a:rPr lang="de-DE" smtClean="0"/>
-              <a:t>12.12.2016</a:t>
+              <a:t>13.12.2016</a:t>
             </a:fld>
-            <a:endParaRPr lang="de-DE"/>
+            <a:endParaRPr lang="de-DE" dirty="0"/>
           </a:p>
         </p:txBody>
       </p:sp>
@@ -715,7 +931,7 @@
           <a:bodyPr/>
           <a:lstStyle/>
           <a:p>
-            <a:endParaRPr lang="de-DE"/>
+            <a:endParaRPr lang="de-DE" dirty="0"/>
           </a:p>
         </p:txBody>
       </p:sp>
@@ -738,14 +954,14 @@
               <a:rPr lang="de-DE" smtClean="0"/>
               <a:t>‹Nr.›</a:t>
             </a:fld>
-            <a:endParaRPr lang="de-DE"/>
+            <a:endParaRPr lang="de-DE" dirty="0"/>
           </a:p>
         </p:txBody>
       </p:sp>
     </p:spTree>
     <p:extLst>
       <p:ext uri="{BB962C8B-B14F-4D97-AF65-F5344CB8AC3E}">
-        <p14:creationId xmlns:p14="http://schemas.microsoft.com/office/powerpoint/2010/main" val="3671156379"/>
+        <p14:creationId xmlns:p14="http://schemas.microsoft.com/office/powerpoint/2010/main" val="810318544"/>
       </p:ext>
     </p:extLst>
   </p:cSld>
@@ -788,9 +1004,10 @@
           <a:lstStyle/>
           <a:p>
             <a:r>
-              <a:rPr lang="de-DE"/>
+              <a:rPr lang="de-DE" smtClean="0"/>
               <a:t>Titelmasterformat durch Klicken bearbeiten</a:t>
             </a:r>
+            <a:endParaRPr lang="de-DE"/>
           </a:p>
         </p:txBody>
       </p:sp>
@@ -811,37 +1028,38 @@
           <a:p>
             <a:pPr lvl="0"/>
             <a:r>
-              <a:rPr lang="de-DE"/>
-              <a:t>Formatvorlagen des Textmasters bearbeiten</a:t>
+              <a:rPr lang="de-DE" smtClean="0"/>
+              <a:t>Textmasterformat bearbeiten</a:t>
             </a:r>
           </a:p>
           <a:p>
             <a:pPr lvl="1"/>
             <a:r>
-              <a:rPr lang="de-DE"/>
+              <a:rPr lang="de-DE" smtClean="0"/>
               <a:t>Zweite Ebene</a:t>
             </a:r>
           </a:p>
           <a:p>
             <a:pPr lvl="2"/>
             <a:r>
-              <a:rPr lang="de-DE"/>
+              <a:rPr lang="de-DE" smtClean="0"/>
               <a:t>Dritte Ebene</a:t>
             </a:r>
           </a:p>
           <a:p>
             <a:pPr lvl="3"/>
             <a:r>
-              <a:rPr lang="de-DE"/>
+              <a:rPr lang="de-DE" smtClean="0"/>
               <a:t>Vierte Ebene</a:t>
             </a:r>
           </a:p>
           <a:p>
             <a:pPr lvl="4"/>
             <a:r>
-              <a:rPr lang="de-DE"/>
+              <a:rPr lang="de-DE" smtClean="0"/>
               <a:t>Fünfte Ebene</a:t>
             </a:r>
+            <a:endParaRPr lang="de-DE"/>
           </a:p>
         </p:txBody>
       </p:sp>
@@ -862,9 +1080,9 @@
           <a:p>
             <a:fld id="{88350639-16E7-402A-85F7-0DBCD150AD57}" type="datetimeFigureOut">
               <a:rPr lang="de-DE" smtClean="0"/>
-              <a:t>12.12.2016</a:t>
+              <a:t>13.12.2016</a:t>
             </a:fld>
-            <a:endParaRPr lang="de-DE"/>
+            <a:endParaRPr lang="de-DE" dirty="0"/>
           </a:p>
         </p:txBody>
       </p:sp>
@@ -883,7 +1101,7 @@
           <a:bodyPr/>
           <a:lstStyle/>
           <a:p>
-            <a:endParaRPr lang="de-DE"/>
+            <a:endParaRPr lang="de-DE" dirty="0"/>
           </a:p>
         </p:txBody>
       </p:sp>
@@ -906,14 +1124,14 @@
               <a:rPr lang="de-DE" smtClean="0"/>
               <a:t>‹Nr.›</a:t>
             </a:fld>
-            <a:endParaRPr lang="de-DE"/>
+            <a:endParaRPr lang="de-DE" dirty="0"/>
           </a:p>
         </p:txBody>
       </p:sp>
     </p:spTree>
     <p:extLst>
       <p:ext uri="{BB962C8B-B14F-4D97-AF65-F5344CB8AC3E}">
-        <p14:creationId xmlns:p14="http://schemas.microsoft.com/office/powerpoint/2010/main" val="4155165621"/>
+        <p14:creationId xmlns:p14="http://schemas.microsoft.com/office/powerpoint/2010/main" val="1116904604"/>
       </p:ext>
     </p:extLst>
   </p:cSld>
@@ -952,8 +1170,8 @@
         </p:nvSpPr>
         <p:spPr>
           <a:xfrm>
-            <a:off x="8724900" y="365125"/>
-            <a:ext cx="2628900" cy="5811838"/>
+            <a:off x="11785600" y="274639"/>
+            <a:ext cx="3657600" cy="5851525"/>
           </a:xfrm>
         </p:spPr>
         <p:txBody>
@@ -961,9 +1179,10 @@
           <a:lstStyle/>
           <a:p>
             <a:r>
-              <a:rPr lang="de-DE"/>
+              <a:rPr lang="de-DE" smtClean="0"/>
               <a:t>Titelmasterformat durch Klicken bearbeiten</a:t>
             </a:r>
+            <a:endParaRPr lang="de-DE"/>
           </a:p>
         </p:txBody>
       </p:sp>
@@ -979,8 +1198,8 @@
         </p:nvSpPr>
         <p:spPr>
           <a:xfrm>
-            <a:off x="838200" y="365125"/>
-            <a:ext cx="7734300" cy="5811838"/>
+            <a:off x="812800" y="274639"/>
+            <a:ext cx="10769600" cy="5851525"/>
           </a:xfrm>
         </p:spPr>
         <p:txBody>
@@ -989,37 +1208,38 @@
           <a:p>
             <a:pPr lvl="0"/>
             <a:r>
-              <a:rPr lang="de-DE"/>
-              <a:t>Formatvorlagen des Textmasters bearbeiten</a:t>
+              <a:rPr lang="de-DE" smtClean="0"/>
+              <a:t>Textmasterformat bearbeiten</a:t>
             </a:r>
           </a:p>
           <a:p>
             <a:pPr lvl="1"/>
             <a:r>
-              <a:rPr lang="de-DE"/>
+              <a:rPr lang="de-DE" smtClean="0"/>
               <a:t>Zweite Ebene</a:t>
             </a:r>
           </a:p>
           <a:p>
             <a:pPr lvl="2"/>
             <a:r>
-              <a:rPr lang="de-DE"/>
+              <a:rPr lang="de-DE" smtClean="0"/>
               <a:t>Dritte Ebene</a:t>
             </a:r>
           </a:p>
           <a:p>
             <a:pPr lvl="3"/>
             <a:r>
-              <a:rPr lang="de-DE"/>
+              <a:rPr lang="de-DE" smtClean="0"/>
               <a:t>Vierte Ebene</a:t>
             </a:r>
           </a:p>
           <a:p>
             <a:pPr lvl="4"/>
             <a:r>
-              <a:rPr lang="de-DE"/>
+              <a:rPr lang="de-DE" smtClean="0"/>
               <a:t>Fünfte Ebene</a:t>
             </a:r>
+            <a:endParaRPr lang="de-DE"/>
           </a:p>
         </p:txBody>
       </p:sp>
@@ -1040,9 +1260,9 @@
           <a:p>
             <a:fld id="{88350639-16E7-402A-85F7-0DBCD150AD57}" type="datetimeFigureOut">
               <a:rPr lang="de-DE" smtClean="0"/>
-              <a:t>12.12.2016</a:t>
+              <a:t>13.12.2016</a:t>
             </a:fld>
-            <a:endParaRPr lang="de-DE"/>
+            <a:endParaRPr lang="de-DE" dirty="0"/>
           </a:p>
         </p:txBody>
       </p:sp>
@@ -1061,7 +1281,7 @@
           <a:bodyPr/>
           <a:lstStyle/>
           <a:p>
-            <a:endParaRPr lang="de-DE"/>
+            <a:endParaRPr lang="de-DE" dirty="0"/>
           </a:p>
         </p:txBody>
       </p:sp>
@@ -1084,14 +1304,14 @@
               <a:rPr lang="de-DE" smtClean="0"/>
               <a:t>‹Nr.›</a:t>
             </a:fld>
-            <a:endParaRPr lang="de-DE"/>
+            <a:endParaRPr lang="de-DE" dirty="0"/>
           </a:p>
         </p:txBody>
       </p:sp>
     </p:spTree>
     <p:extLst>
       <p:ext uri="{BB962C8B-B14F-4D97-AF65-F5344CB8AC3E}">
-        <p14:creationId xmlns:p14="http://schemas.microsoft.com/office/powerpoint/2010/main" val="3700377826"/>
+        <p14:creationId xmlns:p14="http://schemas.microsoft.com/office/powerpoint/2010/main" val="394702928"/>
       </p:ext>
     </p:extLst>
   </p:cSld>
@@ -1134,9 +1354,10 @@
           <a:lstStyle/>
           <a:p>
             <a:r>
-              <a:rPr lang="de-DE"/>
+              <a:rPr lang="de-DE" smtClean="0"/>
               <a:t>Titelmasterformat durch Klicken bearbeiten</a:t>
             </a:r>
+            <a:endParaRPr lang="de-DE"/>
           </a:p>
         </p:txBody>
       </p:sp>
@@ -1157,37 +1378,38 @@
           <a:p>
             <a:pPr lvl="0"/>
             <a:r>
-              <a:rPr lang="de-DE"/>
-              <a:t>Formatvorlagen des Textmasters bearbeiten</a:t>
+              <a:rPr lang="de-DE" smtClean="0"/>
+              <a:t>Textmasterformat bearbeiten</a:t>
             </a:r>
           </a:p>
           <a:p>
             <a:pPr lvl="1"/>
             <a:r>
-              <a:rPr lang="de-DE"/>
+              <a:rPr lang="de-DE" smtClean="0"/>
               <a:t>Zweite Ebene</a:t>
             </a:r>
           </a:p>
           <a:p>
             <a:pPr lvl="2"/>
             <a:r>
-              <a:rPr lang="de-DE"/>
+              <a:rPr lang="de-DE" smtClean="0"/>
               <a:t>Dritte Ebene</a:t>
             </a:r>
           </a:p>
           <a:p>
             <a:pPr lvl="3"/>
             <a:r>
-              <a:rPr lang="de-DE"/>
+              <a:rPr lang="de-DE" smtClean="0"/>
               <a:t>Vierte Ebene</a:t>
             </a:r>
           </a:p>
           <a:p>
             <a:pPr lvl="4"/>
             <a:r>
-              <a:rPr lang="de-DE"/>
+              <a:rPr lang="de-DE" smtClean="0"/>
               <a:t>Fünfte Ebene</a:t>
             </a:r>
+            <a:endParaRPr lang="de-DE"/>
           </a:p>
         </p:txBody>
       </p:sp>
@@ -1208,9 +1430,9 @@
           <a:p>
             <a:fld id="{88350639-16E7-402A-85F7-0DBCD150AD57}" type="datetimeFigureOut">
               <a:rPr lang="de-DE" smtClean="0"/>
-              <a:t>12.12.2016</a:t>
+              <a:t>13.12.2016</a:t>
             </a:fld>
-            <a:endParaRPr lang="de-DE"/>
+            <a:endParaRPr lang="de-DE" dirty="0"/>
           </a:p>
         </p:txBody>
       </p:sp>
@@ -1229,7 +1451,7 @@
           <a:bodyPr/>
           <a:lstStyle/>
           <a:p>
-            <a:endParaRPr lang="de-DE"/>
+            <a:endParaRPr lang="de-DE" dirty="0"/>
           </a:p>
         </p:txBody>
       </p:sp>
@@ -1252,14 +1474,14 @@
               <a:rPr lang="de-DE" smtClean="0"/>
               <a:t>‹Nr.›</a:t>
             </a:fld>
-            <a:endParaRPr lang="de-DE"/>
+            <a:endParaRPr lang="de-DE" dirty="0"/>
           </a:p>
         </p:txBody>
       </p:sp>
     </p:spTree>
     <p:extLst>
       <p:ext uri="{BB962C8B-B14F-4D97-AF65-F5344CB8AC3E}">
-        <p14:creationId xmlns:p14="http://schemas.microsoft.com/office/powerpoint/2010/main" val="2356991953"/>
+        <p14:creationId xmlns:p14="http://schemas.microsoft.com/office/powerpoint/2010/main" val="4278581671"/>
       </p:ext>
     </p:extLst>
   </p:cSld>
@@ -1298,22 +1520,23 @@
         </p:nvSpPr>
         <p:spPr>
           <a:xfrm>
-            <a:off x="831850" y="1709738"/>
-            <a:ext cx="10515600" cy="2852737"/>
+            <a:off x="963084" y="4406905"/>
+            <a:ext cx="10363200" cy="1362075"/>
           </a:xfrm>
         </p:spPr>
         <p:txBody>
-          <a:bodyPr anchor="b"/>
+          <a:bodyPr anchor="t"/>
           <a:lstStyle>
-            <a:lvl1pPr>
-              <a:defRPr sz="6000"/>
+            <a:lvl1pPr algn="l">
+              <a:defRPr sz="4000" b="1" cap="all"/>
             </a:lvl1pPr>
           </a:lstStyle>
           <a:p>
             <a:r>
-              <a:rPr lang="de-DE"/>
+              <a:rPr lang="de-DE" smtClean="0"/>
               <a:t>Titelmasterformat durch Klicken bearbeiten</a:t>
             </a:r>
+            <a:endParaRPr lang="de-DE"/>
           </a:p>
         </p:txBody>
       </p:sp>
@@ -1329,16 +1552,16 @@
         </p:nvSpPr>
         <p:spPr>
           <a:xfrm>
-            <a:off x="831850" y="4589463"/>
-            <a:ext cx="10515600" cy="1500187"/>
+            <a:off x="963084" y="2906713"/>
+            <a:ext cx="10363200" cy="1500187"/>
           </a:xfrm>
         </p:spPr>
         <p:txBody>
-          <a:bodyPr/>
+          <a:bodyPr anchor="b"/>
           <a:lstStyle>
             <a:lvl1pPr marL="0" indent="0">
               <a:buNone/>
-              <a:defRPr sz="2400">
+              <a:defRPr sz="2000">
                 <a:solidFill>
                   <a:schemeClr val="tx1">
                     <a:tint val="75000"/>
@@ -1348,7 +1571,7 @@
             </a:lvl1pPr>
             <a:lvl2pPr marL="457200" indent="0">
               <a:buNone/>
-              <a:defRPr sz="2000">
+              <a:defRPr sz="1800">
                 <a:solidFill>
                   <a:schemeClr val="tx1">
                     <a:tint val="75000"/>
@@ -1358,7 +1581,7 @@
             </a:lvl2pPr>
             <a:lvl3pPr marL="914400" indent="0">
               <a:buNone/>
-              <a:defRPr sz="1800">
+              <a:defRPr sz="1600">
                 <a:solidFill>
                   <a:schemeClr val="tx1">
                     <a:tint val="75000"/>
@@ -1368,7 +1591,7 @@
             </a:lvl3pPr>
             <a:lvl4pPr marL="1371600" indent="0">
               <a:buNone/>
-              <a:defRPr sz="1600">
+              <a:defRPr sz="1400">
                 <a:solidFill>
                   <a:schemeClr val="tx1">
                     <a:tint val="75000"/>
@@ -1378,7 +1601,7 @@
             </a:lvl4pPr>
             <a:lvl5pPr marL="1828800" indent="0">
               <a:buNone/>
-              <a:defRPr sz="1600">
+              <a:defRPr sz="1400">
                 <a:solidFill>
                   <a:schemeClr val="tx1">
                     <a:tint val="75000"/>
@@ -1388,7 +1611,7 @@
             </a:lvl5pPr>
             <a:lvl6pPr marL="2286000" indent="0">
               <a:buNone/>
-              <a:defRPr sz="1600">
+              <a:defRPr sz="1400">
                 <a:solidFill>
                   <a:schemeClr val="tx1">
                     <a:tint val="75000"/>
@@ -1398,7 +1621,7 @@
             </a:lvl6pPr>
             <a:lvl7pPr marL="2743200" indent="0">
               <a:buNone/>
-              <a:defRPr sz="1600">
+              <a:defRPr sz="1400">
                 <a:solidFill>
                   <a:schemeClr val="tx1">
                     <a:tint val="75000"/>
@@ -1408,7 +1631,7 @@
             </a:lvl7pPr>
             <a:lvl8pPr marL="3200400" indent="0">
               <a:buNone/>
-              <a:defRPr sz="1600">
+              <a:defRPr sz="1400">
                 <a:solidFill>
                   <a:schemeClr val="tx1">
                     <a:tint val="75000"/>
@@ -1418,7 +1641,7 @@
             </a:lvl8pPr>
             <a:lvl9pPr marL="3657600" indent="0">
               <a:buNone/>
-              <a:defRPr sz="1600">
+              <a:defRPr sz="1400">
                 <a:solidFill>
                   <a:schemeClr val="tx1">
                     <a:tint val="75000"/>
@@ -1430,8 +1653,8 @@
           <a:p>
             <a:pPr lvl="0"/>
             <a:r>
-              <a:rPr lang="de-DE"/>
-              <a:t>Formatvorlagen des Textmasters bearbeiten</a:t>
+              <a:rPr lang="de-DE" smtClean="0"/>
+              <a:t>Textmasterformat bearbeiten</a:t>
             </a:r>
           </a:p>
         </p:txBody>
@@ -1453,9 +1676,9 @@
           <a:p>
             <a:fld id="{88350639-16E7-402A-85F7-0DBCD150AD57}" type="datetimeFigureOut">
               <a:rPr lang="de-DE" smtClean="0"/>
-              <a:t>12.12.2016</a:t>
+              <a:t>13.12.2016</a:t>
             </a:fld>
-            <a:endParaRPr lang="de-DE"/>
+            <a:endParaRPr lang="de-DE" dirty="0"/>
           </a:p>
         </p:txBody>
       </p:sp>
@@ -1474,7 +1697,7 @@
           <a:bodyPr/>
           <a:lstStyle/>
           <a:p>
-            <a:endParaRPr lang="de-DE"/>
+            <a:endParaRPr lang="de-DE" dirty="0"/>
           </a:p>
         </p:txBody>
       </p:sp>
@@ -1497,14 +1720,14 @@
               <a:rPr lang="de-DE" smtClean="0"/>
               <a:t>‹Nr.›</a:t>
             </a:fld>
-            <a:endParaRPr lang="de-DE"/>
+            <a:endParaRPr lang="de-DE" dirty="0"/>
           </a:p>
         </p:txBody>
       </p:sp>
     </p:spTree>
     <p:extLst>
       <p:ext uri="{BB962C8B-B14F-4D97-AF65-F5344CB8AC3E}">
-        <p14:creationId xmlns:p14="http://schemas.microsoft.com/office/powerpoint/2010/main" val="1535962675"/>
+        <p14:creationId xmlns:p14="http://schemas.microsoft.com/office/powerpoint/2010/main" val="1045756587"/>
       </p:ext>
     </p:extLst>
   </p:cSld>
@@ -1547,9 +1770,10 @@
           <a:lstStyle/>
           <a:p>
             <a:r>
-              <a:rPr lang="de-DE"/>
+              <a:rPr lang="de-DE" smtClean="0"/>
               <a:t>Titelmasterformat durch Klicken bearbeiten</a:t>
             </a:r>
+            <a:endParaRPr lang="de-DE"/>
           </a:p>
         </p:txBody>
       </p:sp>
@@ -1565,47 +1789,76 @@
         </p:nvSpPr>
         <p:spPr>
           <a:xfrm>
-            <a:off x="838200" y="1825625"/>
-            <a:ext cx="5181600" cy="4351338"/>
+            <a:off x="812800" y="1600204"/>
+            <a:ext cx="7213600" cy="4525963"/>
           </a:xfrm>
         </p:spPr>
         <p:txBody>
           <a:bodyPr/>
-          <a:lstStyle/>
+          <a:lstStyle>
+            <a:lvl1pPr>
+              <a:defRPr sz="2800"/>
+            </a:lvl1pPr>
+            <a:lvl2pPr>
+              <a:defRPr sz="2400"/>
+            </a:lvl2pPr>
+            <a:lvl3pPr>
+              <a:defRPr sz="2000"/>
+            </a:lvl3pPr>
+            <a:lvl4pPr>
+              <a:defRPr sz="1800"/>
+            </a:lvl4pPr>
+            <a:lvl5pPr>
+              <a:defRPr sz="1800"/>
+            </a:lvl5pPr>
+            <a:lvl6pPr>
+              <a:defRPr sz="1800"/>
+            </a:lvl6pPr>
+            <a:lvl7pPr>
+              <a:defRPr sz="1800"/>
+            </a:lvl7pPr>
+            <a:lvl8pPr>
+              <a:defRPr sz="1800"/>
+            </a:lvl8pPr>
+            <a:lvl9pPr>
+              <a:defRPr sz="1800"/>
+            </a:lvl9pPr>
+          </a:lstStyle>
           <a:p>
             <a:pPr lvl="0"/>
             <a:r>
-              <a:rPr lang="de-DE"/>
-              <a:t>Formatvorlagen des Textmasters bearbeiten</a:t>
+              <a:rPr lang="de-DE" smtClean="0"/>
+              <a:t>Textmasterformat bearbeiten</a:t>
             </a:r>
           </a:p>
           <a:p>
             <a:pPr lvl="1"/>
             <a:r>
-              <a:rPr lang="de-DE"/>
+              <a:rPr lang="de-DE" smtClean="0"/>
               <a:t>Zweite Ebene</a:t>
             </a:r>
           </a:p>
           <a:p>
             <a:pPr lvl="2"/>
             <a:r>
-              <a:rPr lang="de-DE"/>
+              <a:rPr lang="de-DE" smtClean="0"/>
               <a:t>Dritte Ebene</a:t>
             </a:r>
           </a:p>
           <a:p>
             <a:pPr lvl="3"/>
             <a:r>
-              <a:rPr lang="de-DE"/>
+              <a:rPr lang="de-DE" smtClean="0"/>
               <a:t>Vierte Ebene</a:t>
             </a:r>
           </a:p>
           <a:p>
             <a:pPr lvl="4"/>
             <a:r>
-              <a:rPr lang="de-DE"/>
+              <a:rPr lang="de-DE" smtClean="0"/>
               <a:t>Fünfte Ebene</a:t>
             </a:r>
+            <a:endParaRPr lang="de-DE"/>
           </a:p>
         </p:txBody>
       </p:sp>
@@ -1621,47 +1874,76 @@
         </p:nvSpPr>
         <p:spPr>
           <a:xfrm>
-            <a:off x="6172200" y="1825625"/>
-            <a:ext cx="5181600" cy="4351338"/>
+            <a:off x="8229600" y="1600204"/>
+            <a:ext cx="7213600" cy="4525963"/>
           </a:xfrm>
         </p:spPr>
         <p:txBody>
           <a:bodyPr/>
-          <a:lstStyle/>
+          <a:lstStyle>
+            <a:lvl1pPr>
+              <a:defRPr sz="2800"/>
+            </a:lvl1pPr>
+            <a:lvl2pPr>
+              <a:defRPr sz="2400"/>
+            </a:lvl2pPr>
+            <a:lvl3pPr>
+              <a:defRPr sz="2000"/>
+            </a:lvl3pPr>
+            <a:lvl4pPr>
+              <a:defRPr sz="1800"/>
+            </a:lvl4pPr>
+            <a:lvl5pPr>
+              <a:defRPr sz="1800"/>
+            </a:lvl5pPr>
+            <a:lvl6pPr>
+              <a:defRPr sz="1800"/>
+            </a:lvl6pPr>
+            <a:lvl7pPr>
+              <a:defRPr sz="1800"/>
+            </a:lvl7pPr>
+            <a:lvl8pPr>
+              <a:defRPr sz="1800"/>
+            </a:lvl8pPr>
+            <a:lvl9pPr>
+              <a:defRPr sz="1800"/>
+            </a:lvl9pPr>
+          </a:lstStyle>
           <a:p>
             <a:pPr lvl="0"/>
             <a:r>
-              <a:rPr lang="de-DE"/>
-              <a:t>Formatvorlagen des Textmasters bearbeiten</a:t>
+              <a:rPr lang="de-DE" smtClean="0"/>
+              <a:t>Textmasterformat bearbeiten</a:t>
             </a:r>
           </a:p>
           <a:p>
             <a:pPr lvl="1"/>
             <a:r>
-              <a:rPr lang="de-DE"/>
+              <a:rPr lang="de-DE" smtClean="0"/>
               <a:t>Zweite Ebene</a:t>
             </a:r>
           </a:p>
           <a:p>
             <a:pPr lvl="2"/>
             <a:r>
-              <a:rPr lang="de-DE"/>
+              <a:rPr lang="de-DE" smtClean="0"/>
               <a:t>Dritte Ebene</a:t>
             </a:r>
           </a:p>
           <a:p>
             <a:pPr lvl="3"/>
             <a:r>
-              <a:rPr lang="de-DE"/>
+              <a:rPr lang="de-DE" smtClean="0"/>
               <a:t>Vierte Ebene</a:t>
             </a:r>
           </a:p>
           <a:p>
             <a:pPr lvl="4"/>
             <a:r>
-              <a:rPr lang="de-DE"/>
+              <a:rPr lang="de-DE" smtClean="0"/>
               <a:t>Fünfte Ebene</a:t>
             </a:r>
+            <a:endParaRPr lang="de-DE"/>
           </a:p>
         </p:txBody>
       </p:sp>
@@ -1682,9 +1964,9 @@
           <a:p>
             <a:fld id="{88350639-16E7-402A-85F7-0DBCD150AD57}" type="datetimeFigureOut">
               <a:rPr lang="de-DE" smtClean="0"/>
-              <a:t>12.12.2016</a:t>
+              <a:t>13.12.2016</a:t>
             </a:fld>
-            <a:endParaRPr lang="de-DE"/>
+            <a:endParaRPr lang="de-DE" dirty="0"/>
           </a:p>
         </p:txBody>
       </p:sp>
@@ -1703,7 +1985,7 @@
           <a:bodyPr/>
           <a:lstStyle/>
           <a:p>
-            <a:endParaRPr lang="de-DE"/>
+            <a:endParaRPr lang="de-DE" dirty="0"/>
           </a:p>
         </p:txBody>
       </p:sp>
@@ -1726,14 +2008,14 @@
               <a:rPr lang="de-DE" smtClean="0"/>
               <a:t>‹Nr.›</a:t>
             </a:fld>
-            <a:endParaRPr lang="de-DE"/>
+            <a:endParaRPr lang="de-DE" dirty="0"/>
           </a:p>
         </p:txBody>
       </p:sp>
     </p:spTree>
     <p:extLst>
       <p:ext uri="{BB962C8B-B14F-4D97-AF65-F5344CB8AC3E}">
-        <p14:creationId xmlns:p14="http://schemas.microsoft.com/office/powerpoint/2010/main" val="2755798351"/>
+        <p14:creationId xmlns:p14="http://schemas.microsoft.com/office/powerpoint/2010/main" val="3488961135"/>
       </p:ext>
     </p:extLst>
   </p:cSld>
@@ -1772,18 +2054,23 @@
         </p:nvSpPr>
         <p:spPr>
           <a:xfrm>
-            <a:off x="839788" y="365125"/>
-            <a:ext cx="10515600" cy="1325563"/>
+            <a:off x="609600" y="274638"/>
+            <a:ext cx="10972800" cy="1143000"/>
           </a:xfrm>
         </p:spPr>
         <p:txBody>
           <a:bodyPr/>
-          <a:lstStyle/>
-          <a:p>
-            <a:r>
-              <a:rPr lang="de-DE"/>
+          <a:lstStyle>
+            <a:lvl1pPr>
+              <a:defRPr/>
+            </a:lvl1pPr>
+          </a:lstStyle>
+          <a:p>
+            <a:r>
+              <a:rPr lang="de-DE" smtClean="0"/>
               <a:t>Titelmasterformat durch Klicken bearbeiten</a:t>
             </a:r>
+            <a:endParaRPr lang="de-DE"/>
           </a:p>
         </p:txBody>
       </p:sp>
@@ -1799,8 +2086,8 @@
         </p:nvSpPr>
         <p:spPr>
           <a:xfrm>
-            <a:off x="839788" y="1681163"/>
-            <a:ext cx="5157787" cy="823912"/>
+            <a:off x="609600" y="1535113"/>
+            <a:ext cx="5386917" cy="639762"/>
           </a:xfrm>
         </p:spPr>
         <p:txBody>
@@ -1846,8 +2133,8 @@
           <a:p>
             <a:pPr lvl="0"/>
             <a:r>
-              <a:rPr lang="de-DE"/>
-              <a:t>Formatvorlagen des Textmasters bearbeiten</a:t>
+              <a:rPr lang="de-DE" smtClean="0"/>
+              <a:t>Textmasterformat bearbeiten</a:t>
             </a:r>
           </a:p>
         </p:txBody>
@@ -1864,47 +2151,76 @@
         </p:nvSpPr>
         <p:spPr>
           <a:xfrm>
-            <a:off x="839788" y="2505075"/>
-            <a:ext cx="5157787" cy="3684588"/>
+            <a:off x="609600" y="2174875"/>
+            <a:ext cx="5386917" cy="3951288"/>
           </a:xfrm>
         </p:spPr>
         <p:txBody>
           <a:bodyPr/>
-          <a:lstStyle/>
+          <a:lstStyle>
+            <a:lvl1pPr>
+              <a:defRPr sz="2400"/>
+            </a:lvl1pPr>
+            <a:lvl2pPr>
+              <a:defRPr sz="2000"/>
+            </a:lvl2pPr>
+            <a:lvl3pPr>
+              <a:defRPr sz="1800"/>
+            </a:lvl3pPr>
+            <a:lvl4pPr>
+              <a:defRPr sz="1600"/>
+            </a:lvl4pPr>
+            <a:lvl5pPr>
+              <a:defRPr sz="1600"/>
+            </a:lvl5pPr>
+            <a:lvl6pPr>
+              <a:defRPr sz="1600"/>
+            </a:lvl6pPr>
+            <a:lvl7pPr>
+              <a:defRPr sz="1600"/>
+            </a:lvl7pPr>
+            <a:lvl8pPr>
+              <a:defRPr sz="1600"/>
+            </a:lvl8pPr>
+            <a:lvl9pPr>
+              <a:defRPr sz="1600"/>
+            </a:lvl9pPr>
+          </a:lstStyle>
           <a:p>
             <a:pPr lvl="0"/>
             <a:r>
-              <a:rPr lang="de-DE"/>
-              <a:t>Formatvorlagen des Textmasters bearbeiten</a:t>
+              <a:rPr lang="de-DE" smtClean="0"/>
+              <a:t>Textmasterformat bearbeiten</a:t>
             </a:r>
           </a:p>
           <a:p>
             <a:pPr lvl="1"/>
             <a:r>
-              <a:rPr lang="de-DE"/>
+              <a:rPr lang="de-DE" smtClean="0"/>
               <a:t>Zweite Ebene</a:t>
             </a:r>
           </a:p>
           <a:p>
             <a:pPr lvl="2"/>
             <a:r>
-              <a:rPr lang="de-DE"/>
+              <a:rPr lang="de-DE" smtClean="0"/>
               <a:t>Dritte Ebene</a:t>
             </a:r>
           </a:p>
           <a:p>
             <a:pPr lvl="3"/>
             <a:r>
-              <a:rPr lang="de-DE"/>
+              <a:rPr lang="de-DE" smtClean="0"/>
               <a:t>Vierte Ebene</a:t>
             </a:r>
           </a:p>
           <a:p>
             <a:pPr lvl="4"/>
             <a:r>
-              <a:rPr lang="de-DE"/>
+              <a:rPr lang="de-DE" smtClean="0"/>
               <a:t>Fünfte Ebene</a:t>
             </a:r>
+            <a:endParaRPr lang="de-DE"/>
           </a:p>
         </p:txBody>
       </p:sp>
@@ -1920,8 +2236,8 @@
         </p:nvSpPr>
         <p:spPr>
           <a:xfrm>
-            <a:off x="6172200" y="1681163"/>
-            <a:ext cx="5183188" cy="823912"/>
+            <a:off x="6193370" y="1535113"/>
+            <a:ext cx="5389033" cy="639762"/>
           </a:xfrm>
         </p:spPr>
         <p:txBody>
@@ -1967,8 +2283,8 @@
           <a:p>
             <a:pPr lvl="0"/>
             <a:r>
-              <a:rPr lang="de-DE"/>
-              <a:t>Formatvorlagen des Textmasters bearbeiten</a:t>
+              <a:rPr lang="de-DE" smtClean="0"/>
+              <a:t>Textmasterformat bearbeiten</a:t>
             </a:r>
           </a:p>
         </p:txBody>
@@ -1985,47 +2301,76 @@
         </p:nvSpPr>
         <p:spPr>
           <a:xfrm>
-            <a:off x="6172200" y="2505075"/>
-            <a:ext cx="5183188" cy="3684588"/>
+            <a:off x="6193370" y="2174875"/>
+            <a:ext cx="5389033" cy="3951288"/>
           </a:xfrm>
         </p:spPr>
         <p:txBody>
           <a:bodyPr/>
-          <a:lstStyle/>
+          <a:lstStyle>
+            <a:lvl1pPr>
+              <a:defRPr sz="2400"/>
+            </a:lvl1pPr>
+            <a:lvl2pPr>
+              <a:defRPr sz="2000"/>
+            </a:lvl2pPr>
+            <a:lvl3pPr>
+              <a:defRPr sz="1800"/>
+            </a:lvl3pPr>
+            <a:lvl4pPr>
+              <a:defRPr sz="1600"/>
+            </a:lvl4pPr>
+            <a:lvl5pPr>
+              <a:defRPr sz="1600"/>
+            </a:lvl5pPr>
+            <a:lvl6pPr>
+              <a:defRPr sz="1600"/>
+            </a:lvl6pPr>
+            <a:lvl7pPr>
+              <a:defRPr sz="1600"/>
+            </a:lvl7pPr>
+            <a:lvl8pPr>
+              <a:defRPr sz="1600"/>
+            </a:lvl8pPr>
+            <a:lvl9pPr>
+              <a:defRPr sz="1600"/>
+            </a:lvl9pPr>
+          </a:lstStyle>
           <a:p>
             <a:pPr lvl="0"/>
             <a:r>
-              <a:rPr lang="de-DE"/>
-              <a:t>Formatvorlagen des Textmasters bearbeiten</a:t>
+              <a:rPr lang="de-DE" smtClean="0"/>
+              <a:t>Textmasterformat bearbeiten</a:t>
             </a:r>
           </a:p>
           <a:p>
             <a:pPr lvl="1"/>
             <a:r>
-              <a:rPr lang="de-DE"/>
+              <a:rPr lang="de-DE" smtClean="0"/>
               <a:t>Zweite Ebene</a:t>
             </a:r>
           </a:p>
           <a:p>
             <a:pPr lvl="2"/>
             <a:r>
-              <a:rPr lang="de-DE"/>
+              <a:rPr lang="de-DE" smtClean="0"/>
               <a:t>Dritte Ebene</a:t>
             </a:r>
           </a:p>
           <a:p>
             <a:pPr lvl="3"/>
             <a:r>
-              <a:rPr lang="de-DE"/>
+              <a:rPr lang="de-DE" smtClean="0"/>
               <a:t>Vierte Ebene</a:t>
             </a:r>
           </a:p>
           <a:p>
             <a:pPr lvl="4"/>
             <a:r>
-              <a:rPr lang="de-DE"/>
+              <a:rPr lang="de-DE" smtClean="0"/>
               <a:t>Fünfte Ebene</a:t>
             </a:r>
+            <a:endParaRPr lang="de-DE"/>
           </a:p>
         </p:txBody>
       </p:sp>
@@ -2046,9 +2391,9 @@
           <a:p>
             <a:fld id="{88350639-16E7-402A-85F7-0DBCD150AD57}" type="datetimeFigureOut">
               <a:rPr lang="de-DE" smtClean="0"/>
-              <a:t>12.12.2016</a:t>
+              <a:t>13.12.2016</a:t>
             </a:fld>
-            <a:endParaRPr lang="de-DE"/>
+            <a:endParaRPr lang="de-DE" dirty="0"/>
           </a:p>
         </p:txBody>
       </p:sp>
@@ -2067,7 +2412,7 @@
           <a:bodyPr/>
           <a:lstStyle/>
           <a:p>
-            <a:endParaRPr lang="de-DE"/>
+            <a:endParaRPr lang="de-DE" dirty="0"/>
           </a:p>
         </p:txBody>
       </p:sp>
@@ -2090,14 +2435,14 @@
               <a:rPr lang="de-DE" smtClean="0"/>
               <a:t>‹Nr.›</a:t>
             </a:fld>
-            <a:endParaRPr lang="de-DE"/>
+            <a:endParaRPr lang="de-DE" dirty="0"/>
           </a:p>
         </p:txBody>
       </p:sp>
     </p:spTree>
     <p:extLst>
       <p:ext uri="{BB962C8B-B14F-4D97-AF65-F5344CB8AC3E}">
-        <p14:creationId xmlns:p14="http://schemas.microsoft.com/office/powerpoint/2010/main" val="1118537986"/>
+        <p14:creationId xmlns:p14="http://schemas.microsoft.com/office/powerpoint/2010/main" val="3569897096"/>
       </p:ext>
     </p:extLst>
   </p:cSld>
@@ -2140,9 +2485,10 @@
           <a:lstStyle/>
           <a:p>
             <a:r>
-              <a:rPr lang="de-DE"/>
+              <a:rPr lang="de-DE" smtClean="0"/>
               <a:t>Titelmasterformat durch Klicken bearbeiten</a:t>
             </a:r>
+            <a:endParaRPr lang="de-DE"/>
           </a:p>
         </p:txBody>
       </p:sp>
@@ -2163,9 +2509,9 @@
           <a:p>
             <a:fld id="{88350639-16E7-402A-85F7-0DBCD150AD57}" type="datetimeFigureOut">
               <a:rPr lang="de-DE" smtClean="0"/>
-              <a:t>12.12.2016</a:t>
+              <a:t>13.12.2016</a:t>
             </a:fld>
-            <a:endParaRPr lang="de-DE"/>
+            <a:endParaRPr lang="de-DE" dirty="0"/>
           </a:p>
         </p:txBody>
       </p:sp>
@@ -2184,7 +2530,7 @@
           <a:bodyPr/>
           <a:lstStyle/>
           <a:p>
-            <a:endParaRPr lang="de-DE"/>
+            <a:endParaRPr lang="de-DE" dirty="0"/>
           </a:p>
         </p:txBody>
       </p:sp>
@@ -2207,14 +2553,14 @@
               <a:rPr lang="de-DE" smtClean="0"/>
               <a:t>‹Nr.›</a:t>
             </a:fld>
-            <a:endParaRPr lang="de-DE"/>
+            <a:endParaRPr lang="de-DE" dirty="0"/>
           </a:p>
         </p:txBody>
       </p:sp>
     </p:spTree>
     <p:extLst>
       <p:ext uri="{BB962C8B-B14F-4D97-AF65-F5344CB8AC3E}">
-        <p14:creationId xmlns:p14="http://schemas.microsoft.com/office/powerpoint/2010/main" val="907303182"/>
+        <p14:creationId xmlns:p14="http://schemas.microsoft.com/office/powerpoint/2010/main" val="487179210"/>
       </p:ext>
     </p:extLst>
   </p:cSld>
@@ -2258,9 +2604,9 @@
           <a:p>
             <a:fld id="{88350639-16E7-402A-85F7-0DBCD150AD57}" type="datetimeFigureOut">
               <a:rPr lang="de-DE" smtClean="0"/>
-              <a:t>12.12.2016</a:t>
+              <a:t>13.12.2016</a:t>
             </a:fld>
-            <a:endParaRPr lang="de-DE"/>
+            <a:endParaRPr lang="de-DE" dirty="0"/>
           </a:p>
         </p:txBody>
       </p:sp>
@@ -2279,7 +2625,7 @@
           <a:bodyPr/>
           <a:lstStyle/>
           <a:p>
-            <a:endParaRPr lang="de-DE"/>
+            <a:endParaRPr lang="de-DE" dirty="0"/>
           </a:p>
         </p:txBody>
       </p:sp>
@@ -2302,14 +2648,14 @@
               <a:rPr lang="de-DE" smtClean="0"/>
               <a:t>‹Nr.›</a:t>
             </a:fld>
-            <a:endParaRPr lang="de-DE"/>
+            <a:endParaRPr lang="de-DE" dirty="0"/>
           </a:p>
         </p:txBody>
       </p:sp>
     </p:spTree>
     <p:extLst>
       <p:ext uri="{BB962C8B-B14F-4D97-AF65-F5344CB8AC3E}">
-        <p14:creationId xmlns:p14="http://schemas.microsoft.com/office/powerpoint/2010/main" val="3472107159"/>
+        <p14:creationId xmlns:p14="http://schemas.microsoft.com/office/powerpoint/2010/main" val="3407823001"/>
       </p:ext>
     </p:extLst>
   </p:cSld>
@@ -2348,22 +2694,23 @@
         </p:nvSpPr>
         <p:spPr>
           <a:xfrm>
-            <a:off x="839788" y="457200"/>
-            <a:ext cx="3932237" cy="1600200"/>
+            <a:off x="609603" y="273050"/>
+            <a:ext cx="4011084" cy="1162050"/>
           </a:xfrm>
         </p:spPr>
         <p:txBody>
           <a:bodyPr anchor="b"/>
           <a:lstStyle>
-            <a:lvl1pPr>
-              <a:defRPr sz="3200"/>
+            <a:lvl1pPr algn="l">
+              <a:defRPr sz="2000" b="1"/>
             </a:lvl1pPr>
           </a:lstStyle>
           <a:p>
             <a:r>
-              <a:rPr lang="de-DE"/>
+              <a:rPr lang="de-DE" smtClean="0"/>
               <a:t>Titelmasterformat durch Klicken bearbeiten</a:t>
             </a:r>
+            <a:endParaRPr lang="de-DE"/>
           </a:p>
         </p:txBody>
       </p:sp>
@@ -2379,8 +2726,8 @@
         </p:nvSpPr>
         <p:spPr>
           <a:xfrm>
-            <a:off x="5183188" y="987425"/>
-            <a:ext cx="6172200" cy="4873625"/>
+            <a:off x="4766733" y="273052"/>
+            <a:ext cx="6815667" cy="5853113"/>
           </a:xfrm>
         </p:spPr>
         <p:txBody>
@@ -2417,37 +2764,38 @@
           <a:p>
             <a:pPr lvl="0"/>
             <a:r>
-              <a:rPr lang="de-DE"/>
-              <a:t>Formatvorlagen des Textmasters bearbeiten</a:t>
+              <a:rPr lang="de-DE" smtClean="0"/>
+              <a:t>Textmasterformat bearbeiten</a:t>
             </a:r>
           </a:p>
           <a:p>
             <a:pPr lvl="1"/>
             <a:r>
-              <a:rPr lang="de-DE"/>
+              <a:rPr lang="de-DE" smtClean="0"/>
               <a:t>Zweite Ebene</a:t>
             </a:r>
           </a:p>
           <a:p>
             <a:pPr lvl="2"/>
             <a:r>
-              <a:rPr lang="de-DE"/>
+              <a:rPr lang="de-DE" smtClean="0"/>
               <a:t>Dritte Ebene</a:t>
             </a:r>
           </a:p>
           <a:p>
             <a:pPr lvl="3"/>
             <a:r>
-              <a:rPr lang="de-DE"/>
+              <a:rPr lang="de-DE" smtClean="0"/>
               <a:t>Vierte Ebene</a:t>
             </a:r>
           </a:p>
           <a:p>
             <a:pPr lvl="4"/>
             <a:r>
-              <a:rPr lang="de-DE"/>
+              <a:rPr lang="de-DE" smtClean="0"/>
               <a:t>Fünfte Ebene</a:t>
             </a:r>
+            <a:endParaRPr lang="de-DE"/>
           </a:p>
         </p:txBody>
       </p:sp>
@@ -2463,8 +2811,8 @@
         </p:nvSpPr>
         <p:spPr>
           <a:xfrm>
-            <a:off x="839788" y="2057400"/>
-            <a:ext cx="3932237" cy="3811588"/>
+            <a:off x="609603" y="1435102"/>
+            <a:ext cx="4011084" cy="4691063"/>
           </a:xfrm>
         </p:spPr>
         <p:txBody>
@@ -2472,46 +2820,46 @@
           <a:lstStyle>
             <a:lvl1pPr marL="0" indent="0">
               <a:buNone/>
-              <a:defRPr sz="1600"/>
+              <a:defRPr sz="1400"/>
             </a:lvl1pPr>
             <a:lvl2pPr marL="457200" indent="0">
               <a:buNone/>
-              <a:defRPr sz="1400"/>
+              <a:defRPr sz="1200"/>
             </a:lvl2pPr>
             <a:lvl3pPr marL="914400" indent="0">
               <a:buNone/>
-              <a:defRPr sz="1200"/>
+              <a:defRPr sz="1000"/>
             </a:lvl3pPr>
             <a:lvl4pPr marL="1371600" indent="0">
               <a:buNone/>
-              <a:defRPr sz="1000"/>
+              <a:defRPr sz="900"/>
             </a:lvl4pPr>
             <a:lvl5pPr marL="1828800" indent="0">
               <a:buNone/>
-              <a:defRPr sz="1000"/>
+              <a:defRPr sz="900"/>
             </a:lvl5pPr>
             <a:lvl6pPr marL="2286000" indent="0">
               <a:buNone/>
-              <a:defRPr sz="1000"/>
+              <a:defRPr sz="900"/>
             </a:lvl6pPr>
             <a:lvl7pPr marL="2743200" indent="0">
               <a:buNone/>
-              <a:defRPr sz="1000"/>
+              <a:defRPr sz="900"/>
             </a:lvl7pPr>
             <a:lvl8pPr marL="3200400" indent="0">
               <a:buNone/>
-              <a:defRPr sz="1000"/>
+              <a:defRPr sz="900"/>
             </a:lvl8pPr>
             <a:lvl9pPr marL="3657600" indent="0">
               <a:buNone/>
-              <a:defRPr sz="1000"/>
+              <a:defRPr sz="900"/>
             </a:lvl9pPr>
           </a:lstStyle>
           <a:p>
             <a:pPr lvl="0"/>
             <a:r>
-              <a:rPr lang="de-DE"/>
-              <a:t>Formatvorlagen des Textmasters bearbeiten</a:t>
+              <a:rPr lang="de-DE" smtClean="0"/>
+              <a:t>Textmasterformat bearbeiten</a:t>
             </a:r>
           </a:p>
         </p:txBody>
@@ -2533,9 +2881,9 @@
           <a:p>
             <a:fld id="{88350639-16E7-402A-85F7-0DBCD150AD57}" type="datetimeFigureOut">
               <a:rPr lang="de-DE" smtClean="0"/>
-              <a:t>12.12.2016</a:t>
+              <a:t>13.12.2016</a:t>
             </a:fld>
-            <a:endParaRPr lang="de-DE"/>
+            <a:endParaRPr lang="de-DE" dirty="0"/>
           </a:p>
         </p:txBody>
       </p:sp>
@@ -2554,7 +2902,7 @@
           <a:bodyPr/>
           <a:lstStyle/>
           <a:p>
-            <a:endParaRPr lang="de-DE"/>
+            <a:endParaRPr lang="de-DE" dirty="0"/>
           </a:p>
         </p:txBody>
       </p:sp>
@@ -2577,14 +2925,14 @@
               <a:rPr lang="de-DE" smtClean="0"/>
               <a:t>‹Nr.›</a:t>
             </a:fld>
-            <a:endParaRPr lang="de-DE"/>
+            <a:endParaRPr lang="de-DE" dirty="0"/>
           </a:p>
         </p:txBody>
       </p:sp>
     </p:spTree>
     <p:extLst>
       <p:ext uri="{BB962C8B-B14F-4D97-AF65-F5344CB8AC3E}">
-        <p14:creationId xmlns:p14="http://schemas.microsoft.com/office/powerpoint/2010/main" val="2829836837"/>
+        <p14:creationId xmlns:p14="http://schemas.microsoft.com/office/powerpoint/2010/main" val="1804117597"/>
       </p:ext>
     </p:extLst>
   </p:cSld>
@@ -2623,22 +2971,23 @@
         </p:nvSpPr>
         <p:spPr>
           <a:xfrm>
-            <a:off x="839788" y="457200"/>
-            <a:ext cx="3932237" cy="1600200"/>
+            <a:off x="2389717" y="4800600"/>
+            <a:ext cx="7315200" cy="566738"/>
           </a:xfrm>
         </p:spPr>
         <p:txBody>
           <a:bodyPr anchor="b"/>
           <a:lstStyle>
-            <a:lvl1pPr>
-              <a:defRPr sz="3200"/>
+            <a:lvl1pPr algn="l">
+              <a:defRPr sz="2000" b="1"/>
             </a:lvl1pPr>
           </a:lstStyle>
           <a:p>
             <a:r>
-              <a:rPr lang="de-DE"/>
+              <a:rPr lang="de-DE" smtClean="0"/>
               <a:t>Titelmasterformat durch Klicken bearbeiten</a:t>
             </a:r>
+            <a:endParaRPr lang="de-DE"/>
           </a:p>
         </p:txBody>
       </p:sp>
@@ -2654,8 +3003,8 @@
         </p:nvSpPr>
         <p:spPr>
           <a:xfrm>
-            <a:off x="5183188" y="987425"/>
-            <a:ext cx="6172200" cy="4873625"/>
+            <a:off x="2389717" y="612775"/>
+            <a:ext cx="7315200" cy="4114800"/>
           </a:xfrm>
         </p:spPr>
         <p:txBody>
@@ -2715,8 +3064,8 @@
         </p:nvSpPr>
         <p:spPr>
           <a:xfrm>
-            <a:off x="839788" y="2057400"/>
-            <a:ext cx="3932237" cy="3811588"/>
+            <a:off x="2389717" y="5367338"/>
+            <a:ext cx="7315200" cy="804862"/>
           </a:xfrm>
         </p:spPr>
         <p:txBody>
@@ -2724,46 +3073,46 @@
           <a:lstStyle>
             <a:lvl1pPr marL="0" indent="0">
               <a:buNone/>
-              <a:defRPr sz="1600"/>
+              <a:defRPr sz="1400"/>
             </a:lvl1pPr>
             <a:lvl2pPr marL="457200" indent="0">
               <a:buNone/>
-              <a:defRPr sz="1400"/>
+              <a:defRPr sz="1200"/>
             </a:lvl2pPr>
             <a:lvl3pPr marL="914400" indent="0">
               <a:buNone/>
-              <a:defRPr sz="1200"/>
+              <a:defRPr sz="1000"/>
             </a:lvl3pPr>
             <a:lvl4pPr marL="1371600" indent="0">
               <a:buNone/>
-              <a:defRPr sz="1000"/>
+              <a:defRPr sz="900"/>
             </a:lvl4pPr>
             <a:lvl5pPr marL="1828800" indent="0">
               <a:buNone/>
-              <a:defRPr sz="1000"/>
+              <a:defRPr sz="900"/>
             </a:lvl5pPr>
             <a:lvl6pPr marL="2286000" indent="0">
               <a:buNone/>
-              <a:defRPr sz="1000"/>
+              <a:defRPr sz="900"/>
             </a:lvl6pPr>
             <a:lvl7pPr marL="2743200" indent="0">
               <a:buNone/>
-              <a:defRPr sz="1000"/>
+              <a:defRPr sz="900"/>
             </a:lvl7pPr>
             <a:lvl8pPr marL="3200400" indent="0">
               <a:buNone/>
-              <a:defRPr sz="1000"/>
+              <a:defRPr sz="900"/>
             </a:lvl8pPr>
             <a:lvl9pPr marL="3657600" indent="0">
               <a:buNone/>
-              <a:defRPr sz="1000"/>
+              <a:defRPr sz="900"/>
             </a:lvl9pPr>
           </a:lstStyle>
           <a:p>
             <a:pPr lvl="0"/>
             <a:r>
-              <a:rPr lang="de-DE"/>
-              <a:t>Formatvorlagen des Textmasters bearbeiten</a:t>
+              <a:rPr lang="de-DE" smtClean="0"/>
+              <a:t>Textmasterformat bearbeiten</a:t>
             </a:r>
           </a:p>
         </p:txBody>
@@ -2785,9 +3134,9 @@
           <a:p>
             <a:fld id="{88350639-16E7-402A-85F7-0DBCD150AD57}" type="datetimeFigureOut">
               <a:rPr lang="de-DE" smtClean="0"/>
-              <a:t>12.12.2016</a:t>
+              <a:t>13.12.2016</a:t>
             </a:fld>
-            <a:endParaRPr lang="de-DE"/>
+            <a:endParaRPr lang="de-DE" dirty="0"/>
           </a:p>
         </p:txBody>
       </p:sp>
@@ -2806,7 +3155,7 @@
           <a:bodyPr/>
           <a:lstStyle/>
           <a:p>
-            <a:endParaRPr lang="de-DE"/>
+            <a:endParaRPr lang="de-DE" dirty="0"/>
           </a:p>
         </p:txBody>
       </p:sp>
@@ -2829,14 +3178,14 @@
               <a:rPr lang="de-DE" smtClean="0"/>
               <a:t>‹Nr.›</a:t>
             </a:fld>
-            <a:endParaRPr lang="de-DE"/>
+            <a:endParaRPr lang="de-DE" dirty="0"/>
           </a:p>
         </p:txBody>
       </p:sp>
     </p:spTree>
     <p:extLst>
       <p:ext uri="{BB962C8B-B14F-4D97-AF65-F5344CB8AC3E}">
-        <p14:creationId xmlns:p14="http://schemas.microsoft.com/office/powerpoint/2010/main" val="2256815883"/>
+        <p14:creationId xmlns:p14="http://schemas.microsoft.com/office/powerpoint/2010/main" val="215056849"/>
       </p:ext>
     </p:extLst>
   </p:cSld>
@@ -2880,8 +3229,8 @@
         </p:nvSpPr>
         <p:spPr>
           <a:xfrm>
-            <a:off x="838200" y="365125"/>
-            <a:ext cx="10515600" cy="1325563"/>
+            <a:off x="609600" y="274638"/>
+            <a:ext cx="10972800" cy="1143000"/>
           </a:xfrm>
           <a:prstGeom prst="rect">
             <a:avLst/>
@@ -2894,9 +3243,10 @@
           <a:lstStyle/>
           <a:p>
             <a:r>
-              <a:rPr lang="de-DE"/>
+              <a:rPr lang="de-DE" smtClean="0"/>
               <a:t>Titelmasterformat durch Klicken bearbeiten</a:t>
             </a:r>
+            <a:endParaRPr lang="de-DE"/>
           </a:p>
         </p:txBody>
       </p:sp>
@@ -2912,8 +3262,8 @@
         </p:nvSpPr>
         <p:spPr>
           <a:xfrm>
-            <a:off x="838200" y="1825625"/>
-            <a:ext cx="10515600" cy="4351338"/>
+            <a:off x="609600" y="1600204"/>
+            <a:ext cx="10972800" cy="4525963"/>
           </a:xfrm>
           <a:prstGeom prst="rect">
             <a:avLst/>
@@ -2927,37 +3277,38 @@
           <a:p>
             <a:pPr lvl="0"/>
             <a:r>
-              <a:rPr lang="de-DE"/>
-              <a:t>Formatvorlagen des Textmasters bearbeiten</a:t>
+              <a:rPr lang="de-DE" smtClean="0"/>
+              <a:t>Textmasterformat bearbeiten</a:t>
             </a:r>
           </a:p>
           <a:p>
             <a:pPr lvl="1"/>
             <a:r>
-              <a:rPr lang="de-DE"/>
+              <a:rPr lang="de-DE" smtClean="0"/>
               <a:t>Zweite Ebene</a:t>
             </a:r>
           </a:p>
           <a:p>
             <a:pPr lvl="2"/>
             <a:r>
-              <a:rPr lang="de-DE"/>
+              <a:rPr lang="de-DE" smtClean="0"/>
               <a:t>Dritte Ebene</a:t>
             </a:r>
           </a:p>
           <a:p>
             <a:pPr lvl="3"/>
             <a:r>
-              <a:rPr lang="de-DE"/>
+              <a:rPr lang="de-DE" smtClean="0"/>
               <a:t>Vierte Ebene</a:t>
             </a:r>
           </a:p>
           <a:p>
             <a:pPr lvl="4"/>
             <a:r>
-              <a:rPr lang="de-DE"/>
+              <a:rPr lang="de-DE" smtClean="0"/>
               <a:t>Fünfte Ebene</a:t>
             </a:r>
+            <a:endParaRPr lang="de-DE"/>
           </a:p>
         </p:txBody>
       </p:sp>
@@ -2973,8 +3324,8 @@
         </p:nvSpPr>
         <p:spPr>
           <a:xfrm>
-            <a:off x="838200" y="6356350"/>
-            <a:ext cx="2743200" cy="365125"/>
+            <a:off x="609600" y="6356355"/>
+            <a:ext cx="2844800" cy="365125"/>
           </a:xfrm>
           <a:prstGeom prst="rect">
             <a:avLst/>
@@ -2996,9 +3347,9 @@
           <a:p>
             <a:fld id="{88350639-16E7-402A-85F7-0DBCD150AD57}" type="datetimeFigureOut">
               <a:rPr lang="de-DE" smtClean="0"/>
-              <a:t>12.12.2016</a:t>
+              <a:t>13.12.2016</a:t>
             </a:fld>
-            <a:endParaRPr lang="de-DE"/>
+            <a:endParaRPr lang="de-DE" dirty="0"/>
           </a:p>
         </p:txBody>
       </p:sp>
@@ -3014,8 +3365,8 @@
         </p:nvSpPr>
         <p:spPr>
           <a:xfrm>
-            <a:off x="4038600" y="6356350"/>
-            <a:ext cx="4114800" cy="365125"/>
+            <a:off x="4165600" y="6356355"/>
+            <a:ext cx="3860800" cy="365125"/>
           </a:xfrm>
           <a:prstGeom prst="rect">
             <a:avLst/>
@@ -3035,7 +3386,7 @@
             </a:lvl1pPr>
           </a:lstStyle>
           <a:p>
-            <a:endParaRPr lang="de-DE"/>
+            <a:endParaRPr lang="de-DE" dirty="0"/>
           </a:p>
         </p:txBody>
       </p:sp>
@@ -3051,8 +3402,8 @@
         </p:nvSpPr>
         <p:spPr>
           <a:xfrm>
-            <a:off x="8610600" y="6356350"/>
-            <a:ext cx="2743200" cy="365125"/>
+            <a:off x="8737600" y="6356355"/>
+            <a:ext cx="2844800" cy="365125"/>
           </a:xfrm>
           <a:prstGeom prst="rect">
             <a:avLst/>
@@ -3076,37 +3427,34 @@
               <a:rPr lang="de-DE" smtClean="0"/>
               <a:t>‹Nr.›</a:t>
             </a:fld>
-            <a:endParaRPr lang="de-DE"/>
+            <a:endParaRPr lang="de-DE" dirty="0"/>
           </a:p>
         </p:txBody>
       </p:sp>
     </p:spTree>
     <p:extLst>
       <p:ext uri="{BB962C8B-B14F-4D97-AF65-F5344CB8AC3E}">
-        <p14:creationId xmlns:p14="http://schemas.microsoft.com/office/powerpoint/2010/main" val="3696646093"/>
+        <p14:creationId xmlns:p14="http://schemas.microsoft.com/office/powerpoint/2010/main" val="622766489"/>
       </p:ext>
     </p:extLst>
   </p:cSld>
   <p:clrMap bg1="lt1" tx1="dk1" bg2="lt2" tx2="dk2" accent1="accent1" accent2="accent2" accent3="accent3" accent4="accent4" accent5="accent5" accent6="accent6" hlink="hlink" folHlink="folHlink"/>
   <p:sldLayoutIdLst>
-    <p:sldLayoutId id="2147483649" r:id="rId1"/>
-    <p:sldLayoutId id="2147483650" r:id="rId2"/>
-    <p:sldLayoutId id="2147483651" r:id="rId3"/>
-    <p:sldLayoutId id="2147483652" r:id="rId4"/>
-    <p:sldLayoutId id="2147483653" r:id="rId5"/>
-    <p:sldLayoutId id="2147483654" r:id="rId6"/>
-    <p:sldLayoutId id="2147483655" r:id="rId7"/>
-    <p:sldLayoutId id="2147483656" r:id="rId8"/>
-    <p:sldLayoutId id="2147483657" r:id="rId9"/>
-    <p:sldLayoutId id="2147483658" r:id="rId10"/>
-    <p:sldLayoutId id="2147483659" r:id="rId11"/>
+    <p:sldLayoutId id="2147483673" r:id="rId1"/>
+    <p:sldLayoutId id="2147483674" r:id="rId2"/>
+    <p:sldLayoutId id="2147483675" r:id="rId3"/>
+    <p:sldLayoutId id="2147483676" r:id="rId4"/>
+    <p:sldLayoutId id="2147483677" r:id="rId5"/>
+    <p:sldLayoutId id="2147483678" r:id="rId6"/>
+    <p:sldLayoutId id="2147483679" r:id="rId7"/>
+    <p:sldLayoutId id="2147483680" r:id="rId8"/>
+    <p:sldLayoutId id="2147483681" r:id="rId9"/>
+    <p:sldLayoutId id="2147483682" r:id="rId10"/>
+    <p:sldLayoutId id="2147483683" r:id="rId11"/>
   </p:sldLayoutIdLst>
   <p:txStyles>
     <p:titleStyle>
-      <a:lvl1pPr algn="l" defTabSz="914400" rtl="0" eaLnBrk="1" latinLnBrk="0" hangingPunct="1">
-        <a:lnSpc>
-          <a:spcPct val="90000"/>
-        </a:lnSpc>
+      <a:lvl1pPr algn="ctr" defTabSz="914400" rtl="0" eaLnBrk="1" latinLnBrk="0" hangingPunct="1">
         <a:spcBef>
           <a:spcPct val="0"/>
         </a:spcBef>
@@ -3122,15 +3470,27 @@
       </a:lvl1pPr>
     </p:titleStyle>
     <p:bodyStyle>
-      <a:lvl1pPr marL="228600" indent="-228600" algn="l" defTabSz="914400" rtl="0" eaLnBrk="1" latinLnBrk="0" hangingPunct="1">
-        <a:lnSpc>
-          <a:spcPct val="90000"/>
-        </a:lnSpc>
+      <a:lvl1pPr marL="342900" indent="-342900" algn="l" defTabSz="914400" rtl="0" eaLnBrk="1" latinLnBrk="0" hangingPunct="1">
         <a:spcBef>
-          <a:spcPts val="1000"/>
+          <a:spcPct val="20000"/>
         </a:spcBef>
         <a:buFont typeface="Arial" panose="020B0604020202020204" pitchFamily="34" charset="0"/>
         <a:buChar char="•"/>
+        <a:defRPr sz="3200" kern="1200">
+          <a:solidFill>
+            <a:schemeClr val="tx1"/>
+          </a:solidFill>
+          <a:latin typeface="+mn-lt"/>
+          <a:ea typeface="+mn-ea"/>
+          <a:cs typeface="+mn-cs"/>
+        </a:defRPr>
+      </a:lvl1pPr>
+      <a:lvl2pPr marL="742950" indent="-285750" algn="l" defTabSz="914400" rtl="0" eaLnBrk="1" latinLnBrk="0" hangingPunct="1">
+        <a:spcBef>
+          <a:spcPct val="20000"/>
+        </a:spcBef>
+        <a:buFont typeface="Arial" panose="020B0604020202020204" pitchFamily="34" charset="0"/>
+        <a:buChar char="–"/>
         <a:defRPr sz="2800" kern="1200">
           <a:solidFill>
             <a:schemeClr val="tx1"/>
@@ -3139,13 +3499,10 @@
           <a:ea typeface="+mn-ea"/>
           <a:cs typeface="+mn-cs"/>
         </a:defRPr>
-      </a:lvl1pPr>
-      <a:lvl2pPr marL="685800" indent="-228600" algn="l" defTabSz="914400" rtl="0" eaLnBrk="1" latinLnBrk="0" hangingPunct="1">
-        <a:lnSpc>
-          <a:spcPct val="90000"/>
-        </a:lnSpc>
+      </a:lvl2pPr>
+      <a:lvl3pPr marL="1143000" indent="-228600" algn="l" defTabSz="914400" rtl="0" eaLnBrk="1" latinLnBrk="0" hangingPunct="1">
         <a:spcBef>
-          <a:spcPts val="500"/>
+          <a:spcPct val="20000"/>
         </a:spcBef>
         <a:buFont typeface="Arial" panose="020B0604020202020204" pitchFamily="34" charset="0"/>
         <a:buChar char="•"/>
@@ -3157,13 +3514,40 @@
           <a:ea typeface="+mn-ea"/>
           <a:cs typeface="+mn-cs"/>
         </a:defRPr>
-      </a:lvl2pPr>
-      <a:lvl3pPr marL="1143000" indent="-228600" algn="l" defTabSz="914400" rtl="0" eaLnBrk="1" latinLnBrk="0" hangingPunct="1">
-        <a:lnSpc>
-          <a:spcPct val="90000"/>
-        </a:lnSpc>
+      </a:lvl3pPr>
+      <a:lvl4pPr marL="1600200" indent="-228600" algn="l" defTabSz="914400" rtl="0" eaLnBrk="1" latinLnBrk="0" hangingPunct="1">
         <a:spcBef>
-          <a:spcPts val="500"/>
+          <a:spcPct val="20000"/>
+        </a:spcBef>
+        <a:buFont typeface="Arial" panose="020B0604020202020204" pitchFamily="34" charset="0"/>
+        <a:buChar char="–"/>
+        <a:defRPr sz="2000" kern="1200">
+          <a:solidFill>
+            <a:schemeClr val="tx1"/>
+          </a:solidFill>
+          <a:latin typeface="+mn-lt"/>
+          <a:ea typeface="+mn-ea"/>
+          <a:cs typeface="+mn-cs"/>
+        </a:defRPr>
+      </a:lvl4pPr>
+      <a:lvl5pPr marL="2057400" indent="-228600" algn="l" defTabSz="914400" rtl="0" eaLnBrk="1" latinLnBrk="0" hangingPunct="1">
+        <a:spcBef>
+          <a:spcPct val="20000"/>
+        </a:spcBef>
+        <a:buFont typeface="Arial" panose="020B0604020202020204" pitchFamily="34" charset="0"/>
+        <a:buChar char="»"/>
+        <a:defRPr sz="2000" kern="1200">
+          <a:solidFill>
+            <a:schemeClr val="tx1"/>
+          </a:solidFill>
+          <a:latin typeface="+mn-lt"/>
+          <a:ea typeface="+mn-ea"/>
+          <a:cs typeface="+mn-cs"/>
+        </a:defRPr>
+      </a:lvl5pPr>
+      <a:lvl6pPr marL="2514600" indent="-228600" algn="l" defTabSz="914400" rtl="0" eaLnBrk="1" latinLnBrk="0" hangingPunct="1">
+        <a:spcBef>
+          <a:spcPct val="20000"/>
         </a:spcBef>
         <a:buFont typeface="Arial" panose="020B0604020202020204" pitchFamily="34" charset="0"/>
         <a:buChar char="•"/>
@@ -3175,71 +3559,14 @@
           <a:ea typeface="+mn-ea"/>
           <a:cs typeface="+mn-cs"/>
         </a:defRPr>
-      </a:lvl3pPr>
-      <a:lvl4pPr marL="1600200" indent="-228600" algn="l" defTabSz="914400" rtl="0" eaLnBrk="1" latinLnBrk="0" hangingPunct="1">
-        <a:lnSpc>
-          <a:spcPct val="90000"/>
-        </a:lnSpc>
+      </a:lvl6pPr>
+      <a:lvl7pPr marL="2971800" indent="-228600" algn="l" defTabSz="914400" rtl="0" eaLnBrk="1" latinLnBrk="0" hangingPunct="1">
         <a:spcBef>
-          <a:spcPts val="500"/>
+          <a:spcPct val="20000"/>
         </a:spcBef>
         <a:buFont typeface="Arial" panose="020B0604020202020204" pitchFamily="34" charset="0"/>
         <a:buChar char="•"/>
-        <a:defRPr sz="1800" kern="1200">
-          <a:solidFill>
-            <a:schemeClr val="tx1"/>
-          </a:solidFill>
-          <a:latin typeface="+mn-lt"/>
-          <a:ea typeface="+mn-ea"/>
-          <a:cs typeface="+mn-cs"/>
-        </a:defRPr>
-      </a:lvl4pPr>
-      <a:lvl5pPr marL="2057400" indent="-228600" algn="l" defTabSz="914400" rtl="0" eaLnBrk="1" latinLnBrk="0" hangingPunct="1">
-        <a:lnSpc>
-          <a:spcPct val="90000"/>
-        </a:lnSpc>
-        <a:spcBef>
-          <a:spcPts val="500"/>
-        </a:spcBef>
-        <a:buFont typeface="Arial" panose="020B0604020202020204" pitchFamily="34" charset="0"/>
-        <a:buChar char="•"/>
-        <a:defRPr sz="1800" kern="1200">
-          <a:solidFill>
-            <a:schemeClr val="tx1"/>
-          </a:solidFill>
-          <a:latin typeface="+mn-lt"/>
-          <a:ea typeface="+mn-ea"/>
-          <a:cs typeface="+mn-cs"/>
-        </a:defRPr>
-      </a:lvl5pPr>
-      <a:lvl6pPr marL="2514600" indent="-228600" algn="l" defTabSz="914400" rtl="0" eaLnBrk="1" latinLnBrk="0" hangingPunct="1">
-        <a:lnSpc>
-          <a:spcPct val="90000"/>
-        </a:lnSpc>
-        <a:spcBef>
-          <a:spcPts val="500"/>
-        </a:spcBef>
-        <a:buFont typeface="Arial" panose="020B0604020202020204" pitchFamily="34" charset="0"/>
-        <a:buChar char="•"/>
-        <a:defRPr sz="1800" kern="1200">
-          <a:solidFill>
-            <a:schemeClr val="tx1"/>
-          </a:solidFill>
-          <a:latin typeface="+mn-lt"/>
-          <a:ea typeface="+mn-ea"/>
-          <a:cs typeface="+mn-cs"/>
-        </a:defRPr>
-      </a:lvl6pPr>
-      <a:lvl7pPr marL="2971800" indent="-228600" algn="l" defTabSz="914400" rtl="0" eaLnBrk="1" latinLnBrk="0" hangingPunct="1">
-        <a:lnSpc>
-          <a:spcPct val="90000"/>
-        </a:lnSpc>
-        <a:spcBef>
-          <a:spcPts val="500"/>
-        </a:spcBef>
-        <a:buFont typeface="Arial" panose="020B0604020202020204" pitchFamily="34" charset="0"/>
-        <a:buChar char="•"/>
-        <a:defRPr sz="1800" kern="1200">
+        <a:defRPr sz="2000" kern="1200">
           <a:solidFill>
             <a:schemeClr val="tx1"/>
           </a:solidFill>
@@ -3249,15 +3576,12 @@
         </a:defRPr>
       </a:lvl7pPr>
       <a:lvl8pPr marL="3429000" indent="-228600" algn="l" defTabSz="914400" rtl="0" eaLnBrk="1" latinLnBrk="0" hangingPunct="1">
-        <a:lnSpc>
-          <a:spcPct val="90000"/>
-        </a:lnSpc>
         <a:spcBef>
-          <a:spcPts val="500"/>
+          <a:spcPct val="20000"/>
         </a:spcBef>
         <a:buFont typeface="Arial" panose="020B0604020202020204" pitchFamily="34" charset="0"/>
         <a:buChar char="•"/>
-        <a:defRPr sz="1800" kern="1200">
+        <a:defRPr sz="2000" kern="1200">
           <a:solidFill>
             <a:schemeClr val="tx1"/>
           </a:solidFill>
@@ -3267,15 +3591,12 @@
         </a:defRPr>
       </a:lvl8pPr>
       <a:lvl9pPr marL="3886200" indent="-228600" algn="l" defTabSz="914400" rtl="0" eaLnBrk="1" latinLnBrk="0" hangingPunct="1">
-        <a:lnSpc>
-          <a:spcPct val="90000"/>
-        </a:lnSpc>
         <a:spcBef>
-          <a:spcPts val="500"/>
+          <a:spcPct val="20000"/>
         </a:spcBef>
         <a:buFont typeface="Arial" panose="020B0604020202020204" pitchFamily="34" charset="0"/>
         <a:buChar char="•"/>
-        <a:defRPr sz="1800" kern="1200">
+        <a:defRPr sz="2000" kern="1200">
           <a:solidFill>
             <a:schemeClr val="tx1"/>
           </a:solidFill>
@@ -3456,6 +3777,13 @@
   <p:clrMapOvr>
     <a:masterClrMapping/>
   </p:clrMapOvr>
+  <p:timing>
+    <p:tnLst>
+      <p:par>
+        <p:cTn id="1" dur="indefinite" restart="never" nodeType="tmRoot"/>
+      </p:par>
+    </p:tnLst>
+  </p:timing>
 </p:sld>
 </file>
 
@@ -3493,13 +3821,9 @@
           <a:p>
             <a:r>
               <a:rPr lang="de-DE" dirty="0" smtClean="0"/>
-              <a:t>Ausführungszeiten </a:t>
-            </a:r>
-            <a:r>
-              <a:rPr lang="de-DE" smtClean="0"/>
-              <a:t>im Vergleich</a:t>
-            </a:r>
-            <a:endParaRPr lang="de-DE"/>
+              <a:t>Ausführungszeiten im Vergleich</a:t>
+            </a:r>
+            <a:endParaRPr lang="de-DE" dirty="0"/>
           </a:p>
         </p:txBody>
       </p:sp>
@@ -3515,13 +3839,238 @@
         </p:nvSpPr>
         <p:spPr/>
         <p:txBody>
-          <a:bodyPr/>
-          <a:lstStyle/>
-          <a:p>
-            <a:endParaRPr lang="de-DE"/>
-          </a:p>
-        </p:txBody>
-      </p:sp>
+          <a:bodyPr>
+            <a:normAutofit fontScale="85000" lnSpcReduction="20000"/>
+          </a:bodyPr>
+          <a:lstStyle/>
+          <a:p>
+            <a:r>
+              <a:rPr lang="de-DE" dirty="0" smtClean="0"/>
+              <a:t>JUnit</a:t>
+            </a:r>
+            <a:r>
+              <a:rPr lang="de-DE" dirty="0" smtClean="0"/>
+              <a:t> Tests</a:t>
+            </a:r>
+          </a:p>
+          <a:p>
+            <a:r>
+              <a:rPr lang="de-DE" dirty="0" smtClean="0"/>
+              <a:t>Testobjekte:</a:t>
+            </a:r>
+          </a:p>
+          <a:p>
+            <a:endParaRPr lang="de-DE" dirty="0"/>
+          </a:p>
+          <a:p>
+            <a:endParaRPr lang="de-DE" dirty="0" smtClean="0"/>
+          </a:p>
+          <a:p>
+            <a:endParaRPr lang="de-DE" dirty="0"/>
+          </a:p>
+          <a:p>
+            <a:endParaRPr lang="de-DE" dirty="0" smtClean="0"/>
+          </a:p>
+          <a:p>
+            <a:endParaRPr lang="de-DE" dirty="0"/>
+          </a:p>
+          <a:p>
+            <a:endParaRPr lang="de-DE" dirty="0" smtClean="0"/>
+          </a:p>
+          <a:p>
+            <a:r>
+              <a:rPr lang="de-DE" dirty="0" smtClean="0"/>
+              <a:t>Pro Test werden 100.000 Car Objekte angelegt und kopiert</a:t>
+            </a:r>
+          </a:p>
+          <a:p>
+            <a:r>
+              <a:rPr lang="de-DE" dirty="0" smtClean="0"/>
+              <a:t>Mit </a:t>
+            </a:r>
+            <a:r>
+              <a:rPr lang="de-DE" dirty="0" smtClean="0"/>
+              <a:t>StopWatch</a:t>
+            </a:r>
+            <a:r>
+              <a:rPr lang="de-DE" dirty="0" smtClean="0"/>
+              <a:t>() wird die Zeit für das Klonen gemessen</a:t>
+            </a:r>
+            <a:endParaRPr lang="de-DE" dirty="0"/>
+          </a:p>
+        </p:txBody>
+      </p:sp>
+      <p:graphicFrame>
+        <p:nvGraphicFramePr>
+          <p:cNvPr id="4" name="Objekt 3"/>
+          <p:cNvGraphicFramePr>
+            <a:graphicFrameLocks noChangeAspect="1"/>
+          </p:cNvGraphicFramePr>
+          <p:nvPr>
+            <p:extLst>
+              <p:ext uri="{D42A27DB-BD31-4B8C-83A1-F6EECF244321}">
+                <p14:modId xmlns:p14="http://schemas.microsoft.com/office/powerpoint/2010/main" val="197435926"/>
+              </p:ext>
+            </p:extLst>
+          </p:nvPr>
+        </p:nvGraphicFramePr>
+        <p:xfrm>
+          <a:off x="873125" y="3167063"/>
+          <a:ext cx="7142163" cy="1568450"/>
+        </p:xfrm>
+        <a:graphic>
+          <a:graphicData uri="http://schemas.openxmlformats.org/presentationml/2006/ole">
+            <mc:AlternateContent xmlns:mc="http://schemas.openxmlformats.org/markup-compatibility/2006">
+              <mc:Choice xmlns:v="urn:schemas-microsoft-com:vml" Requires="v">
+                <p:oleObj spid="_x0000_s5141" name="Dokument" r:id="rId3" imgW="8132400" imgH="1786320" progId="Word.OpenDocumentText.12">
+                  <p:embed/>
+                </p:oleObj>
+              </mc:Choice>
+              <mc:Fallback>
+                <p:oleObj name="Dokument" r:id="rId3" imgW="8132400" imgH="1786320" progId="Word.OpenDocumentText.12">
+                  <p:embed/>
+                  <p:pic>
+                    <p:nvPicPr>
+                      <p:cNvPr id="0" name=""/>
+                      <p:cNvPicPr/>
+                      <p:nvPr/>
+                    </p:nvPicPr>
+                    <p:blipFill>
+                      <a:blip r:embed="rId4"/>
+                      <a:stretch>
+                        <a:fillRect/>
+                      </a:stretch>
+                    </p:blipFill>
+                    <p:spPr>
+                      <a:xfrm>
+                        <a:off x="873125" y="3167063"/>
+                        <a:ext cx="7142163" cy="1568450"/>
+                      </a:xfrm>
+                      <a:prstGeom prst="rect">
+                        <a:avLst/>
+                      </a:prstGeom>
+                    </p:spPr>
+                  </p:pic>
+                </p:oleObj>
+              </mc:Fallback>
+            </mc:AlternateContent>
+          </a:graphicData>
+        </a:graphic>
+      </p:graphicFrame>
+      <p:graphicFrame>
+        <p:nvGraphicFramePr>
+          <p:cNvPr id="5" name="Objekt 4"/>
+          <p:cNvGraphicFramePr>
+            <a:graphicFrameLocks noChangeAspect="1"/>
+          </p:cNvGraphicFramePr>
+          <p:nvPr>
+            <p:extLst>
+              <p:ext uri="{D42A27DB-BD31-4B8C-83A1-F6EECF244321}">
+                <p14:modId xmlns:p14="http://schemas.microsoft.com/office/powerpoint/2010/main" val="3094591892"/>
+              </p:ext>
+            </p:extLst>
+          </p:nvPr>
+        </p:nvGraphicFramePr>
+        <p:xfrm>
+          <a:off x="4023336" y="3145083"/>
+          <a:ext cx="3533775" cy="1722437"/>
+        </p:xfrm>
+        <a:graphic>
+          <a:graphicData uri="http://schemas.openxmlformats.org/presentationml/2006/ole">
+            <mc:AlternateContent xmlns:mc="http://schemas.openxmlformats.org/markup-compatibility/2006">
+              <mc:Choice xmlns:v="urn:schemas-microsoft-com:vml" Requires="v">
+                <p:oleObj spid="_x0000_s5142" name="Dokument" r:id="rId5" imgW="3540240" imgH="1786320" progId="Word.OpenDocumentText.12">
+                  <p:embed/>
+                </p:oleObj>
+              </mc:Choice>
+              <mc:Fallback>
+                <p:oleObj name="Dokument" r:id="rId5" imgW="3540240" imgH="1786320" progId="Word.OpenDocumentText.12">
+                  <p:embed/>
+                  <p:pic>
+                    <p:nvPicPr>
+                      <p:cNvPr id="0" name=""/>
+                      <p:cNvPicPr/>
+                      <p:nvPr/>
+                    </p:nvPicPr>
+                    <p:blipFill>
+                      <a:blip r:embed="rId6"/>
+                      <a:stretch>
+                        <a:fillRect/>
+                      </a:stretch>
+                    </p:blipFill>
+                    <p:spPr>
+                      <a:xfrm>
+                        <a:off x="4023336" y="3145083"/>
+                        <a:ext cx="3533775" cy="1722437"/>
+                      </a:xfrm>
+                      <a:prstGeom prst="rect">
+                        <a:avLst/>
+                      </a:prstGeom>
+                    </p:spPr>
+                  </p:pic>
+                </p:oleObj>
+              </mc:Fallback>
+            </mc:AlternateContent>
+          </a:graphicData>
+        </a:graphic>
+      </p:graphicFrame>
+      <p:graphicFrame>
+        <p:nvGraphicFramePr>
+          <p:cNvPr id="6" name="Objekt 5"/>
+          <p:cNvGraphicFramePr>
+            <a:graphicFrameLocks noChangeAspect="1"/>
+          </p:cNvGraphicFramePr>
+          <p:nvPr>
+            <p:extLst>
+              <p:ext uri="{D42A27DB-BD31-4B8C-83A1-F6EECF244321}">
+                <p14:modId xmlns:p14="http://schemas.microsoft.com/office/powerpoint/2010/main" val="1616535"/>
+              </p:ext>
+            </p:extLst>
+          </p:nvPr>
+        </p:nvGraphicFramePr>
+        <p:xfrm>
+          <a:off x="7630869" y="3121637"/>
+          <a:ext cx="3857625" cy="2058987"/>
+        </p:xfrm>
+        <a:graphic>
+          <a:graphicData uri="http://schemas.openxmlformats.org/presentationml/2006/ole">
+            <mc:AlternateContent xmlns:mc="http://schemas.openxmlformats.org/markup-compatibility/2006">
+              <mc:Choice xmlns:v="urn:schemas-microsoft-com:vml" Requires="v">
+                <p:oleObj spid="_x0000_s5143" name="Dokument" r:id="rId7" imgW="3857760" imgH="2058840" progId="Word.OpenDocumentText.12">
+                  <p:embed/>
+                </p:oleObj>
+              </mc:Choice>
+              <mc:Fallback>
+                <p:oleObj name="Dokument" r:id="rId7" imgW="3857760" imgH="2058840" progId="Word.OpenDocumentText.12">
+                  <p:embed/>
+                  <p:pic>
+                    <p:nvPicPr>
+                      <p:cNvPr id="0" name=""/>
+                      <p:cNvPicPr/>
+                      <p:nvPr/>
+                    </p:nvPicPr>
+                    <p:blipFill>
+                      <a:blip r:embed="rId8"/>
+                      <a:stretch>
+                        <a:fillRect/>
+                      </a:stretch>
+                    </p:blipFill>
+                    <p:spPr>
+                      <a:xfrm>
+                        <a:off x="7630869" y="3121637"/>
+                        <a:ext cx="3857625" cy="2058987"/>
+                      </a:xfrm>
+                      <a:prstGeom prst="rect">
+                        <a:avLst/>
+                      </a:prstGeom>
+                    </p:spPr>
+                  </p:pic>
+                </p:oleObj>
+              </mc:Fallback>
+            </mc:AlternateContent>
+          </a:graphicData>
+        </a:graphic>
+      </p:graphicFrame>
     </p:spTree>
     <p:extLst>
       <p:ext uri="{BB962C8B-B14F-4D97-AF65-F5344CB8AC3E}">
@@ -3532,6 +4081,98 @@
   <p:clrMapOvr>
     <a:masterClrMapping/>
   </p:clrMapOvr>
+  <p:timing>
+    <p:tnLst>
+      <p:par>
+        <p:cTn id="1" dur="indefinite" restart="never" nodeType="tmRoot"/>
+      </p:par>
+    </p:tnLst>
+  </p:timing>
+</p:sld>
+</file>
+
+<file path=ppt/slides/slide11.xml><?xml version="1.0" encoding="utf-8"?>
+<p:sld xmlns:a="http://schemas.openxmlformats.org/drawingml/2006/main" xmlns:r="http://schemas.openxmlformats.org/officeDocument/2006/relationships" xmlns:p="http://schemas.openxmlformats.org/presentationml/2006/main">
+  <p:cSld>
+    <p:spTree>
+      <p:nvGrpSpPr>
+        <p:cNvPr id="1" name=""/>
+        <p:cNvGrpSpPr/>
+        <p:nvPr/>
+      </p:nvGrpSpPr>
+      <p:grpSpPr>
+        <a:xfrm>
+          <a:off x="0" y="0"/>
+          <a:ext cx="0" cy="0"/>
+          <a:chOff x="0" y="0"/>
+          <a:chExt cx="0" cy="0"/>
+        </a:xfrm>
+      </p:grpSpPr>
+      <p:sp>
+        <p:nvSpPr>
+          <p:cNvPr id="2" name="Titel 1"/>
+          <p:cNvSpPr>
+            <a:spLocks noGrp="1"/>
+          </p:cNvSpPr>
+          <p:nvPr>
+            <p:ph type="title"/>
+          </p:nvPr>
+        </p:nvSpPr>
+        <p:spPr/>
+        <p:txBody>
+          <a:bodyPr/>
+          <a:lstStyle/>
+          <a:p>
+            <a:r>
+              <a:rPr lang="de-DE" dirty="0" smtClean="0"/>
+              <a:t>Ergebnisse für tiefe Kopien</a:t>
+            </a:r>
+            <a:endParaRPr lang="de-DE" dirty="0"/>
+          </a:p>
+        </p:txBody>
+      </p:sp>
+      <p:graphicFrame>
+        <p:nvGraphicFramePr>
+          <p:cNvPr id="4" name="Inhaltsplatzhalter 3"/>
+          <p:cNvGraphicFramePr>
+            <a:graphicFrameLocks noGrp="1"/>
+          </p:cNvGraphicFramePr>
+          <p:nvPr>
+            <p:ph idx="1"/>
+            <p:extLst>
+              <p:ext uri="{D42A27DB-BD31-4B8C-83A1-F6EECF244321}">
+                <p14:modId xmlns:p14="http://schemas.microsoft.com/office/powerpoint/2010/main" val="2303688198"/>
+              </p:ext>
+            </p:extLst>
+          </p:nvPr>
+        </p:nvGraphicFramePr>
+        <p:xfrm>
+          <a:off x="838200" y="1430215"/>
+          <a:ext cx="10515600" cy="4746748"/>
+        </p:xfrm>
+        <a:graphic>
+          <a:graphicData uri="http://schemas.openxmlformats.org/drawingml/2006/chart">
+            <c:chart xmlns:c="http://schemas.openxmlformats.org/drawingml/2006/chart" xmlns:r="http://schemas.openxmlformats.org/officeDocument/2006/relationships" r:id="rId2"/>
+          </a:graphicData>
+        </a:graphic>
+      </p:graphicFrame>
+    </p:spTree>
+    <p:extLst>
+      <p:ext uri="{BB962C8B-B14F-4D97-AF65-F5344CB8AC3E}">
+        <p14:creationId xmlns:p14="http://schemas.microsoft.com/office/powerpoint/2010/main" val="4266224192"/>
+      </p:ext>
+    </p:extLst>
+  </p:cSld>
+  <p:clrMapOvr>
+    <a:masterClrMapping/>
+  </p:clrMapOvr>
+  <p:timing>
+    <p:tnLst>
+      <p:par>
+        <p:cTn id="1" dur="indefinite" restart="never" nodeType="tmRoot"/>
+      </p:par>
+    </p:tnLst>
+  </p:timing>
 </p:sld>
 </file>
 
@@ -3569,146 +4210,6 @@
           <a:p>
             <a:r>
               <a:rPr lang="de-DE" dirty="0"/>
-              <a:t>Agenda		</a:t>
-            </a:r>
-          </a:p>
-        </p:txBody>
-      </p:sp>
-      <p:sp>
-        <p:nvSpPr>
-          <p:cNvPr id="3" name="Inhaltsplatzhalter 2"/>
-          <p:cNvSpPr>
-            <a:spLocks noGrp="1"/>
-          </p:cNvSpPr>
-          <p:nvPr>
-            <p:ph idx="1"/>
-          </p:nvPr>
-        </p:nvSpPr>
-        <p:spPr/>
-        <p:txBody>
-          <a:bodyPr/>
-          <a:lstStyle/>
-          <a:p>
-            <a:r>
-              <a:rPr lang="de-DE" dirty="0" smtClean="0"/>
-              <a:t>Problemstellung</a:t>
-            </a:r>
-          </a:p>
-          <a:p>
-            <a:r>
-              <a:rPr lang="de-DE" dirty="0" smtClean="0"/>
-              <a:t>Tiefe </a:t>
-            </a:r>
-            <a:r>
-              <a:rPr lang="de-DE" dirty="0"/>
-              <a:t>Kopie vs. Flache Kopie</a:t>
-            </a:r>
-          </a:p>
-          <a:p>
-            <a:r>
-              <a:rPr lang="de-DE" dirty="0"/>
-              <a:t>Java </a:t>
-            </a:r>
-            <a:r>
-              <a:rPr lang="de-DE" dirty="0" err="1"/>
-              <a:t>clone</a:t>
-            </a:r>
-            <a:r>
-              <a:rPr lang="de-DE" dirty="0"/>
-              <a:t>()</a:t>
-            </a:r>
-          </a:p>
-          <a:p>
-            <a:r>
-              <a:rPr lang="de-DE" dirty="0" err="1"/>
-              <a:t>Serialisierung</a:t>
-            </a:r>
-            <a:endParaRPr lang="de-DE" dirty="0"/>
-          </a:p>
-          <a:p>
-            <a:r>
-              <a:rPr lang="de-DE" dirty="0"/>
-              <a:t>„</a:t>
-            </a:r>
-            <a:r>
-              <a:rPr lang="de-DE" dirty="0" err="1"/>
-              <a:t>Copy-Constructor</a:t>
-            </a:r>
-            <a:r>
-              <a:rPr lang="de-DE" dirty="0"/>
-              <a:t>“</a:t>
-            </a:r>
-          </a:p>
-          <a:p>
-            <a:r>
-              <a:rPr lang="de-DE" dirty="0" err="1" smtClean="0"/>
-              <a:t>Reflection</a:t>
-            </a:r>
-            <a:endParaRPr lang="de-DE" dirty="0" smtClean="0"/>
-          </a:p>
-          <a:p>
-            <a:r>
-              <a:rPr lang="de-DE" dirty="0" smtClean="0"/>
-              <a:t>Defensives Kopieren</a:t>
-            </a:r>
-            <a:endParaRPr lang="de-DE" dirty="0" smtClean="0"/>
-          </a:p>
-          <a:p>
-            <a:r>
-              <a:rPr lang="de-DE" dirty="0" smtClean="0"/>
-              <a:t>Ausführungszeiten im Vergleich</a:t>
-            </a:r>
-            <a:endParaRPr lang="de-DE" dirty="0"/>
-          </a:p>
-        </p:txBody>
-      </p:sp>
-    </p:spTree>
-    <p:extLst>
-      <p:ext uri="{BB962C8B-B14F-4D97-AF65-F5344CB8AC3E}">
-        <p14:creationId xmlns:p14="http://schemas.microsoft.com/office/powerpoint/2010/main" val="290097860"/>
-      </p:ext>
-    </p:extLst>
-  </p:cSld>
-  <p:clrMapOvr>
-    <a:masterClrMapping/>
-  </p:clrMapOvr>
-</p:sld>
-</file>
-
-<file path=ppt/slides/slide3.xml><?xml version="1.0" encoding="utf-8"?>
-<p:sld xmlns:a="http://schemas.openxmlformats.org/drawingml/2006/main" xmlns:r="http://schemas.openxmlformats.org/officeDocument/2006/relationships" xmlns:p="http://schemas.openxmlformats.org/presentationml/2006/main">
-  <p:cSld>
-    <p:spTree>
-      <p:nvGrpSpPr>
-        <p:cNvPr id="1" name=""/>
-        <p:cNvGrpSpPr/>
-        <p:nvPr/>
-      </p:nvGrpSpPr>
-      <p:grpSpPr>
-        <a:xfrm>
-          <a:off x="0" y="0"/>
-          <a:ext cx="0" cy="0"/>
-          <a:chOff x="0" y="0"/>
-          <a:chExt cx="0" cy="0"/>
-        </a:xfrm>
-      </p:grpSpPr>
-      <p:sp>
-        <p:nvSpPr>
-          <p:cNvPr id="2" name="Titel 1"/>
-          <p:cNvSpPr>
-            <a:spLocks noGrp="1"/>
-          </p:cNvSpPr>
-          <p:nvPr>
-            <p:ph type="title"/>
-          </p:nvPr>
-        </p:nvSpPr>
-        <p:spPr/>
-        <p:txBody>
-          <a:bodyPr/>
-          <a:lstStyle/>
-          <a:p>
-            <a:r>
-              <a:rPr lang="de-DE" dirty="0"/>
               <a:t>Problemstellung	</a:t>
             </a:r>
           </a:p>
@@ -3755,10 +4256,17 @@
   <p:clrMapOvr>
     <a:masterClrMapping/>
   </p:clrMapOvr>
+  <p:timing>
+    <p:tnLst>
+      <p:par>
+        <p:cTn id="1" dur="indefinite" restart="never" nodeType="tmRoot"/>
+      </p:par>
+    </p:tnLst>
+  </p:timing>
 </p:sld>
 </file>
 
-<file path=ppt/slides/slide4.xml><?xml version="1.0" encoding="utf-8"?>
+<file path=ppt/slides/slide3.xml><?xml version="1.0" encoding="utf-8"?>
 <p:sld xmlns:a="http://schemas.openxmlformats.org/drawingml/2006/main" xmlns:r="http://schemas.openxmlformats.org/officeDocument/2006/relationships" xmlns:p="http://schemas.openxmlformats.org/presentationml/2006/main">
   <p:cSld>
     <p:spTree>
@@ -3866,14 +4374,14 @@
                 <a:gridCol w="4936836">
                   <a:extLst>
                     <a:ext uri="{9D8B030D-6E8A-4147-A177-3AD203B41FA5}">
-                      <a16:colId xmlns:a16="http://schemas.microsoft.com/office/drawing/2014/main" xmlns="" val="392513554"/>
+                      <a16:colId xmlns="" xmlns:a16="http://schemas.microsoft.com/office/drawing/2014/main" val="392513554"/>
                     </a:ext>
                   </a:extLst>
                 </a:gridCol>
                 <a:gridCol w="4936836">
                   <a:extLst>
                     <a:ext uri="{9D8B030D-6E8A-4147-A177-3AD203B41FA5}">
-                      <a16:colId xmlns:a16="http://schemas.microsoft.com/office/drawing/2014/main" xmlns="" val="1329460675"/>
+                      <a16:colId xmlns="" xmlns:a16="http://schemas.microsoft.com/office/drawing/2014/main" val="1329460675"/>
                     </a:ext>
                   </a:extLst>
                 </a:gridCol>
@@ -3907,7 +4415,7 @@
                 </a:tc>
                 <a:extLst>
                   <a:ext uri="{0D108BD9-81ED-4DB2-BD59-A6C34878D82A}">
-                    <a16:rowId xmlns:a16="http://schemas.microsoft.com/office/drawing/2014/main" xmlns="" val="1611136375"/>
+                    <a16:rowId xmlns="" xmlns:a16="http://schemas.microsoft.com/office/drawing/2014/main" val="1611136375"/>
                   </a:ext>
                 </a:extLst>
               </a:tr>
@@ -3950,7 +4458,7 @@
                 </a:tc>
                 <a:extLst>
                   <a:ext uri="{0D108BD9-81ED-4DB2-BD59-A6C34878D82A}">
-                    <a16:rowId xmlns:a16="http://schemas.microsoft.com/office/drawing/2014/main" xmlns="" val="1439821929"/>
+                    <a16:rowId xmlns="" xmlns:a16="http://schemas.microsoft.com/office/drawing/2014/main" val="1439821929"/>
                   </a:ext>
                 </a:extLst>
               </a:tr>
@@ -3992,7 +4500,7 @@
                 </a:tc>
                 <a:extLst>
                   <a:ext uri="{0D108BD9-81ED-4DB2-BD59-A6C34878D82A}">
-                    <a16:rowId xmlns:a16="http://schemas.microsoft.com/office/drawing/2014/main" xmlns="" val="1294418559"/>
+                    <a16:rowId xmlns="" xmlns:a16="http://schemas.microsoft.com/office/drawing/2014/main" val="1294418559"/>
                   </a:ext>
                 </a:extLst>
               </a:tr>
@@ -4010,6 +4518,123 @@
   <p:clrMapOvr>
     <a:masterClrMapping/>
   </p:clrMapOvr>
+  <p:timing>
+    <p:tnLst>
+      <p:par>
+        <p:cTn id="1" dur="indefinite" restart="never" nodeType="tmRoot"/>
+      </p:par>
+    </p:tnLst>
+  </p:timing>
+</p:sld>
+</file>
+
+<file path=ppt/slides/slide4.xml><?xml version="1.0" encoding="utf-8"?>
+<p:sld xmlns:a="http://schemas.openxmlformats.org/drawingml/2006/main" xmlns:r="http://schemas.openxmlformats.org/officeDocument/2006/relationships" xmlns:p="http://schemas.openxmlformats.org/presentationml/2006/main">
+  <p:cSld>
+    <p:spTree>
+      <p:nvGrpSpPr>
+        <p:cNvPr id="1" name=""/>
+        <p:cNvGrpSpPr/>
+        <p:nvPr/>
+      </p:nvGrpSpPr>
+      <p:grpSpPr>
+        <a:xfrm>
+          <a:off x="0" y="0"/>
+          <a:ext cx="0" cy="0"/>
+          <a:chOff x="0" y="0"/>
+          <a:chExt cx="0" cy="0"/>
+        </a:xfrm>
+      </p:grpSpPr>
+      <p:sp>
+        <p:nvSpPr>
+          <p:cNvPr id="2" name="Titel 1"/>
+          <p:cNvSpPr>
+            <a:spLocks noGrp="1"/>
+          </p:cNvSpPr>
+          <p:nvPr>
+            <p:ph type="title"/>
+          </p:nvPr>
+        </p:nvSpPr>
+        <p:spPr/>
+        <p:txBody>
+          <a:bodyPr/>
+          <a:lstStyle/>
+          <a:p>
+            <a:r>
+              <a:rPr lang="de-DE" dirty="0" smtClean="0"/>
+              <a:t>Java clone()</a:t>
+            </a:r>
+            <a:endParaRPr lang="de-DE" dirty="0"/>
+          </a:p>
+        </p:txBody>
+      </p:sp>
+      <p:sp>
+        <p:nvSpPr>
+          <p:cNvPr id="3" name="Inhaltsplatzhalter 2"/>
+          <p:cNvSpPr>
+            <a:spLocks noGrp="1"/>
+          </p:cNvSpPr>
+          <p:nvPr>
+            <p:ph idx="1"/>
+          </p:nvPr>
+        </p:nvSpPr>
+        <p:spPr/>
+        <p:txBody>
+          <a:bodyPr/>
+          <a:lstStyle/>
+          <a:p>
+            <a:r>
+              <a:rPr lang="de-DE" dirty="0" smtClean="0"/>
+              <a:t>Klasse muss </a:t>
+            </a:r>
+            <a:r>
+              <a:rPr lang="de-DE" dirty="0" smtClean="0"/>
+              <a:t>Cloneable</a:t>
+            </a:r>
+            <a:r>
+              <a:rPr lang="de-DE" dirty="0" smtClean="0"/>
+              <a:t>-Interface implementieren</a:t>
+            </a:r>
+          </a:p>
+          <a:p>
+            <a:r>
+              <a:rPr lang="de-DE" dirty="0" smtClean="0"/>
+              <a:t>Und zusätzlich die clone() Methode von Object </a:t>
+            </a:r>
+            <a:r>
+              <a:rPr lang="de-DE" dirty="0" smtClean="0"/>
+              <a:t>überschreiben</a:t>
+            </a:r>
+          </a:p>
+          <a:p>
+            <a:pPr marL="0" indent="0">
+              <a:buNone/>
+            </a:pPr>
+            <a:r>
+              <a:rPr lang="de-DE" dirty="0" smtClean="0"/>
+              <a:t>=&gt; Erzeugt je nach Überschreiben von clone() eine flache bzw. tiefe Kopie.</a:t>
+            </a:r>
+            <a:endParaRPr lang="de-DE" dirty="0"/>
+          </a:p>
+        </p:txBody>
+      </p:sp>
+    </p:spTree>
+    <p:extLst>
+      <p:ext uri="{BB962C8B-B14F-4D97-AF65-F5344CB8AC3E}">
+        <p14:creationId xmlns:p14="http://schemas.microsoft.com/office/powerpoint/2010/main" val="1692291109"/>
+      </p:ext>
+    </p:extLst>
+  </p:cSld>
+  <p:clrMapOvr>
+    <a:masterClrMapping/>
+  </p:clrMapOvr>
+  <p:timing>
+    <p:tnLst>
+      <p:par>
+        <p:cTn id="1" dur="indefinite" restart="never" nodeType="tmRoot"/>
+      </p:par>
+    </p:tnLst>
+  </p:timing>
 </p:sld>
 </file>
 
@@ -4047,83 +4672,253 @@
           <a:p>
             <a:r>
               <a:rPr lang="de-DE" dirty="0" smtClean="0"/>
-              <a:t>Java </a:t>
-            </a:r>
-            <a:r>
-              <a:rPr lang="de-DE" dirty="0" err="1" smtClean="0"/>
-              <a:t>clone</a:t>
-            </a:r>
+              <a:t>Serialisierung</a:t>
+            </a:r>
+            <a:endParaRPr lang="de-DE" dirty="0"/>
+          </a:p>
+        </p:txBody>
+      </p:sp>
+      <p:sp>
+        <p:nvSpPr>
+          <p:cNvPr id="3" name="Inhaltsplatzhalter 2"/>
+          <p:cNvSpPr>
+            <a:spLocks noGrp="1"/>
+          </p:cNvSpPr>
+          <p:nvPr>
+            <p:ph idx="1"/>
+          </p:nvPr>
+        </p:nvSpPr>
+        <p:spPr/>
+        <p:txBody>
+          <a:bodyPr/>
+          <a:lstStyle/>
+          <a:p>
             <a:r>
               <a:rPr lang="de-DE" dirty="0" smtClean="0"/>
-              <a:t>()</a:t>
-            </a:r>
-            <a:endParaRPr lang="de-DE" dirty="0"/>
-          </a:p>
-        </p:txBody>
-      </p:sp>
-      <p:sp>
-        <p:nvSpPr>
-          <p:cNvPr id="3" name="Inhaltsplatzhalter 2"/>
-          <p:cNvSpPr>
-            <a:spLocks noGrp="1"/>
-          </p:cNvSpPr>
-          <p:nvPr>
-            <p:ph idx="1"/>
-          </p:nvPr>
-        </p:nvSpPr>
-        <p:spPr/>
-        <p:txBody>
-          <a:bodyPr/>
-          <a:lstStyle/>
+              <a:t>Serialisierung = Umwandlung in ein übertragbares Format (beispielsweise Byte-Array)</a:t>
+            </a:r>
+          </a:p>
           <a:p>
             <a:r>
               <a:rPr lang="de-DE" dirty="0" smtClean="0"/>
-              <a:t>Klasse muss </a:t>
-            </a:r>
-            <a:r>
-              <a:rPr lang="de-DE" dirty="0" err="1" smtClean="0"/>
-              <a:t>Cloneable</a:t>
+              <a:t>Anschließende Deserialisierung</a:t>
+            </a:r>
+            <a:r>
+              <a:rPr lang="de-DE" dirty="0"/>
+              <a:t> </a:t>
             </a:r>
             <a:r>
               <a:rPr lang="de-DE" dirty="0" smtClean="0"/>
-              <a:t>-Interface implementieren</a:t>
-            </a:r>
-          </a:p>
-          <a:p>
-            <a:r>
-              <a:rPr lang="de-DE" dirty="0" smtClean="0"/>
-              <a:t>Und zusätzlich die </a:t>
-            </a:r>
-            <a:r>
-              <a:rPr lang="de-DE" dirty="0" err="1" smtClean="0"/>
-              <a:t>clone</a:t>
-            </a:r>
-            <a:r>
-              <a:rPr lang="de-DE" dirty="0" smtClean="0"/>
-              <a:t>() Methode von </a:t>
-            </a:r>
-            <a:r>
-              <a:rPr lang="de-DE" dirty="0" err="1" smtClean="0"/>
-              <a:t>Object</a:t>
-            </a:r>
-            <a:r>
-              <a:rPr lang="de-DE" dirty="0" smtClean="0"/>
-              <a:t> überschreiben</a:t>
-            </a:r>
-            <a:endParaRPr lang="de-DE" dirty="0"/>
-          </a:p>
-        </p:txBody>
-      </p:sp>
+              <a:t>um neues Objekt zu erzeugen</a:t>
+            </a:r>
+            <a:endParaRPr lang="de-DE" dirty="0"/>
+          </a:p>
+        </p:txBody>
+      </p:sp>
+      <p:sp>
+        <p:nvSpPr>
+          <p:cNvPr id="4" name="Rectangle 2"/>
+          <p:cNvSpPr>
+            <a:spLocks noChangeArrowheads="1"/>
+          </p:cNvSpPr>
+          <p:nvPr/>
+        </p:nvSpPr>
+        <p:spPr bwMode="auto">
+          <a:xfrm>
+            <a:off x="0" y="0"/>
+            <a:ext cx="12192000" cy="0"/>
+          </a:xfrm>
+          <a:prstGeom prst="rect">
+            <a:avLst/>
+          </a:prstGeom>
+          <a:noFill/>
+          <a:ln>
+            <a:noFill/>
+          </a:ln>
+          <a:effectLst/>
+          <a:extLst>
+            <a:ext uri="{909E8E84-426E-40DD-AFC4-6F175D3DCCD1}">
+              <a14:hiddenFill xmlns:a14="http://schemas.microsoft.com/office/drawing/2010/main">
+                <a:solidFill>
+                  <a:schemeClr val="accent1"/>
+                </a:solidFill>
+              </a14:hiddenFill>
+            </a:ext>
+            <a:ext uri="{91240B29-F687-4F45-9708-019B960494DF}">
+              <a14:hiddenLine xmlns:a14="http://schemas.microsoft.com/office/drawing/2010/main" w="9525">
+                <a:solidFill>
+                  <a:schemeClr val="tx1"/>
+                </a:solidFill>
+                <a:miter lim="800000"/>
+                <a:headEnd/>
+                <a:tailEnd/>
+              </a14:hiddenLine>
+            </a:ext>
+            <a:ext uri="{AF507438-7753-43E0-B8FC-AC1667EBCBE1}">
+              <a14:hiddenEffects xmlns:a14="http://schemas.microsoft.com/office/drawing/2010/main">
+                <a:effectLst>
+                  <a:outerShdw dist="35921" dir="2700000" algn="ctr" rotWithShape="0">
+                    <a:schemeClr val="bg2"/>
+                  </a:outerShdw>
+                </a:effectLst>
+              </a14:hiddenEffects>
+            </a:ext>
+          </a:extLst>
+        </p:spPr>
+        <p:txBody>
+          <a:bodyPr vert="horz" wrap="none" lIns="91440" tIns="45720" rIns="91440" bIns="45720" numCol="1" anchor="ctr" anchorCtr="0" compatLnSpc="1">
+            <a:prstTxWarp prst="textNoShape">
+              <a:avLst/>
+            </a:prstTxWarp>
+            <a:spAutoFit/>
+          </a:bodyPr>
+          <a:lstStyle/>
+          <a:p>
+            <a:endParaRPr lang="de-DE" dirty="0"/>
+          </a:p>
+        </p:txBody>
+      </p:sp>
+      <p:sp>
+        <p:nvSpPr>
+          <p:cNvPr id="6" name="Rectangle 4"/>
+          <p:cNvSpPr>
+            <a:spLocks noChangeArrowheads="1"/>
+          </p:cNvSpPr>
+          <p:nvPr/>
+        </p:nvSpPr>
+        <p:spPr bwMode="auto">
+          <a:xfrm>
+            <a:off x="0" y="0"/>
+            <a:ext cx="12192000" cy="0"/>
+          </a:xfrm>
+          <a:prstGeom prst="rect">
+            <a:avLst/>
+          </a:prstGeom>
+          <a:noFill/>
+          <a:ln>
+            <a:noFill/>
+          </a:ln>
+          <a:effectLst/>
+          <a:extLst>
+            <a:ext uri="{909E8E84-426E-40DD-AFC4-6F175D3DCCD1}">
+              <a14:hiddenFill xmlns:a14="http://schemas.microsoft.com/office/drawing/2010/main">
+                <a:solidFill>
+                  <a:schemeClr val="accent1"/>
+                </a:solidFill>
+              </a14:hiddenFill>
+            </a:ext>
+            <a:ext uri="{91240B29-F687-4F45-9708-019B960494DF}">
+              <a14:hiddenLine xmlns:a14="http://schemas.microsoft.com/office/drawing/2010/main" w="9525">
+                <a:solidFill>
+                  <a:schemeClr val="tx1"/>
+                </a:solidFill>
+                <a:miter lim="800000"/>
+                <a:headEnd/>
+                <a:tailEnd/>
+              </a14:hiddenLine>
+            </a:ext>
+            <a:ext uri="{AF507438-7753-43E0-B8FC-AC1667EBCBE1}">
+              <a14:hiddenEffects xmlns:a14="http://schemas.microsoft.com/office/drawing/2010/main">
+                <a:effectLst>
+                  <a:outerShdw dist="35921" dir="2700000" algn="ctr" rotWithShape="0">
+                    <a:schemeClr val="bg2"/>
+                  </a:outerShdw>
+                </a:effectLst>
+              </a14:hiddenEffects>
+            </a:ext>
+          </a:extLst>
+        </p:spPr>
+        <p:txBody>
+          <a:bodyPr vert="horz" wrap="none" lIns="91440" tIns="45720" rIns="91440" bIns="45720" numCol="1" anchor="ctr" anchorCtr="0" compatLnSpc="1">
+            <a:prstTxWarp prst="textNoShape">
+              <a:avLst/>
+            </a:prstTxWarp>
+            <a:spAutoFit/>
+          </a:bodyPr>
+          <a:lstStyle/>
+          <a:p>
+            <a:endParaRPr lang="de-DE" dirty="0"/>
+          </a:p>
+        </p:txBody>
+      </p:sp>
+      <p:graphicFrame>
+        <p:nvGraphicFramePr>
+          <p:cNvPr id="7" name="Objekt 6"/>
+          <p:cNvGraphicFramePr>
+            <a:graphicFrameLocks noChangeAspect="1"/>
+          </p:cNvGraphicFramePr>
+          <p:nvPr>
+            <p:extLst>
+              <p:ext uri="{D42A27DB-BD31-4B8C-83A1-F6EECF244321}">
+                <p14:modId xmlns:p14="http://schemas.microsoft.com/office/powerpoint/2010/main" val="3368540637"/>
+              </p:ext>
+            </p:extLst>
+          </p:nvPr>
+        </p:nvGraphicFramePr>
+        <p:xfrm>
+          <a:off x="3292475" y="3252788"/>
+          <a:ext cx="5408613" cy="3340100"/>
+        </p:xfrm>
+        <a:graphic>
+          <a:graphicData uri="http://schemas.openxmlformats.org/presentationml/2006/ole">
+            <mc:AlternateContent xmlns:mc="http://schemas.openxmlformats.org/markup-compatibility/2006">
+              <mc:Choice xmlns:v="urn:schemas-microsoft-com:vml" Requires="v">
+                <p:oleObj spid="_x0000_s1038" name="Dokument" r:id="rId3" imgW="6025680" imgH="3718080" progId="Word.OpenDocumentText.12">
+                  <p:embed/>
+                </p:oleObj>
+              </mc:Choice>
+              <mc:Fallback>
+                <p:oleObj name="Dokument" r:id="rId3" imgW="6025680" imgH="3718080" progId="Word.OpenDocumentText.12">
+                  <p:embed/>
+                  <p:pic>
+                    <p:nvPicPr>
+                      <p:cNvPr id="0" name="Object 3"/>
+                      <p:cNvPicPr>
+                        <a:picLocks noChangeAspect="1" noChangeArrowheads="1"/>
+                      </p:cNvPicPr>
+                      <p:nvPr/>
+                    </p:nvPicPr>
+                    <p:blipFill>
+                      <a:blip r:embed="rId4"/>
+                      <a:srcRect/>
+                      <a:stretch>
+                        <a:fillRect/>
+                      </a:stretch>
+                    </p:blipFill>
+                    <p:spPr bwMode="auto">
+                      <a:xfrm>
+                        <a:off x="3292475" y="3252788"/>
+                        <a:ext cx="5408613" cy="3340100"/>
+                      </a:xfrm>
+                      <a:prstGeom prst="rect">
+                        <a:avLst/>
+                      </a:prstGeom>
+                      <a:noFill/>
+                    </p:spPr>
+                  </p:pic>
+                </p:oleObj>
+              </mc:Fallback>
+            </mc:AlternateContent>
+          </a:graphicData>
+        </a:graphic>
+      </p:graphicFrame>
     </p:spTree>
     <p:extLst>
       <p:ext uri="{BB962C8B-B14F-4D97-AF65-F5344CB8AC3E}">
-        <p14:creationId xmlns:p14="http://schemas.microsoft.com/office/powerpoint/2010/main" val="1692291109"/>
+        <p14:creationId xmlns:p14="http://schemas.microsoft.com/office/powerpoint/2010/main" val="1583892773"/>
       </p:ext>
     </p:extLst>
   </p:cSld>
   <p:clrMapOvr>
     <a:masterClrMapping/>
   </p:clrMapOvr>
+  <p:timing>
+    <p:tnLst>
+      <p:par>
+        <p:cTn id="1" dur="indefinite" restart="never" nodeType="tmRoot"/>
+      </p:par>
+    </p:tnLst>
+  </p:timing>
 </p:sld>
 </file>
 
@@ -4160,8 +4955,16 @@
           <a:lstStyle/>
           <a:p>
             <a:r>
-              <a:rPr lang="de-DE" dirty="0" err="1" smtClean="0"/>
-              <a:t>Serialisierung</a:t>
+              <a:rPr lang="de-DE" dirty="0" smtClean="0"/>
+              <a:t>Copy</a:t>
+            </a:r>
+            <a:r>
+              <a:rPr lang="de-DE" dirty="0" smtClean="0"/>
+              <a:t> </a:t>
+            </a:r>
+            <a:r>
+              <a:rPr lang="de-DE" dirty="0" smtClean="0"/>
+              <a:t>Constructor</a:t>
             </a:r>
             <a:endParaRPr lang="de-DE" dirty="0"/>
           </a:p>
@@ -4182,20 +4985,369 @@
           <a:bodyPr/>
           <a:lstStyle/>
           <a:p>
-            <a:endParaRPr lang="de-DE"/>
+            <a:r>
+              <a:rPr lang="de-DE" dirty="0" smtClean="0"/>
+              <a:t>Konstruktor mit typgleichem Objekt als Parameter</a:t>
+            </a:r>
+          </a:p>
+          <a:p>
+            <a:r>
+              <a:rPr lang="de-DE" dirty="0" smtClean="0"/>
+              <a:t>Je nach Implementierung flache oder tiefe Kopie</a:t>
+            </a:r>
+            <a:endParaRPr lang="de-DE" dirty="0"/>
+          </a:p>
+        </p:txBody>
+      </p:sp>
+      <p:sp>
+        <p:nvSpPr>
+          <p:cNvPr id="4" name="Rectangle 2"/>
+          <p:cNvSpPr>
+            <a:spLocks noChangeArrowheads="1"/>
+          </p:cNvSpPr>
+          <p:nvPr/>
+        </p:nvSpPr>
+        <p:spPr bwMode="auto">
+          <a:xfrm>
+            <a:off x="0" y="0"/>
+            <a:ext cx="12192000" cy="0"/>
+          </a:xfrm>
+          <a:prstGeom prst="rect">
+            <a:avLst/>
+          </a:prstGeom>
+          <a:noFill/>
+          <a:ln>
+            <a:noFill/>
+          </a:ln>
+          <a:effectLst/>
+          <a:extLst>
+            <a:ext uri="{909E8E84-426E-40DD-AFC4-6F175D3DCCD1}">
+              <a14:hiddenFill xmlns:a14="http://schemas.microsoft.com/office/drawing/2010/main">
+                <a:solidFill>
+                  <a:schemeClr val="accent1"/>
+                </a:solidFill>
+              </a14:hiddenFill>
+            </a:ext>
+            <a:ext uri="{91240B29-F687-4F45-9708-019B960494DF}">
+              <a14:hiddenLine xmlns:a14="http://schemas.microsoft.com/office/drawing/2010/main" w="9525">
+                <a:solidFill>
+                  <a:schemeClr val="tx1"/>
+                </a:solidFill>
+                <a:miter lim="800000"/>
+                <a:headEnd/>
+                <a:tailEnd/>
+              </a14:hiddenLine>
+            </a:ext>
+            <a:ext uri="{AF507438-7753-43E0-B8FC-AC1667EBCBE1}">
+              <a14:hiddenEffects xmlns:a14="http://schemas.microsoft.com/office/drawing/2010/main">
+                <a:effectLst>
+                  <a:outerShdw dist="35921" dir="2700000" algn="ctr" rotWithShape="0">
+                    <a:schemeClr val="bg2"/>
+                  </a:outerShdw>
+                </a:effectLst>
+              </a14:hiddenEffects>
+            </a:ext>
+          </a:extLst>
+        </p:spPr>
+        <p:txBody>
+          <a:bodyPr vert="horz" wrap="none" lIns="91440" tIns="45720" rIns="91440" bIns="45720" numCol="1" anchor="ctr" anchorCtr="0" compatLnSpc="1">
+            <a:prstTxWarp prst="textNoShape">
+              <a:avLst/>
+            </a:prstTxWarp>
+            <a:spAutoFit/>
+          </a:bodyPr>
+          <a:lstStyle/>
+          <a:p>
+            <a:endParaRPr lang="de-DE" dirty="0"/>
+          </a:p>
+        </p:txBody>
+      </p:sp>
+      <p:graphicFrame>
+        <p:nvGraphicFramePr>
+          <p:cNvPr id="5" name="Objekt 4"/>
+          <p:cNvGraphicFramePr>
+            <a:graphicFrameLocks noChangeAspect="1"/>
+          </p:cNvGraphicFramePr>
+          <p:nvPr>
+            <p:extLst>
+              <p:ext uri="{D42A27DB-BD31-4B8C-83A1-F6EECF244321}">
+                <p14:modId xmlns:p14="http://schemas.microsoft.com/office/powerpoint/2010/main" val="2363616876"/>
+              </p:ext>
+            </p:extLst>
+          </p:nvPr>
+        </p:nvGraphicFramePr>
+        <p:xfrm>
+          <a:off x="880452" y="3251200"/>
+          <a:ext cx="5762625" cy="2247900"/>
+        </p:xfrm>
+        <a:graphic>
+          <a:graphicData uri="http://schemas.openxmlformats.org/presentationml/2006/ole">
+            <mc:AlternateContent xmlns:mc="http://schemas.openxmlformats.org/markup-compatibility/2006">
+              <mc:Choice xmlns:v="urn:schemas-microsoft-com:vml" Requires="v">
+                <p:oleObj spid="_x0000_s2071" name="Dokument" r:id="rId3" imgW="5775241" imgH="2253589" progId="Word.OpenDocumentText.12">
+                  <p:embed/>
+                </p:oleObj>
+              </mc:Choice>
+              <mc:Fallback>
+                <p:oleObj name="Dokument" r:id="rId3" imgW="5775241" imgH="2253589" progId="Word.OpenDocumentText.12">
+                  <p:embed/>
+                  <p:pic>
+                    <p:nvPicPr>
+                      <p:cNvPr id="0" name="Object 1"/>
+                      <p:cNvPicPr>
+                        <a:picLocks noChangeAspect="1" noChangeArrowheads="1"/>
+                      </p:cNvPicPr>
+                      <p:nvPr/>
+                    </p:nvPicPr>
+                    <p:blipFill>
+                      <a:blip r:embed="rId4">
+                        <a:extLst>
+                          <a:ext uri="{28A0092B-C50C-407E-A947-70E740481C1C}">
+                            <a14:useLocalDpi xmlns:a14="http://schemas.microsoft.com/office/drawing/2010/main" val="0"/>
+                          </a:ext>
+                        </a:extLst>
+                      </a:blip>
+                      <a:srcRect/>
+                      <a:stretch>
+                        <a:fillRect/>
+                      </a:stretch>
+                    </p:blipFill>
+                    <p:spPr bwMode="auto">
+                      <a:xfrm>
+                        <a:off x="880452" y="3251200"/>
+                        <a:ext cx="5762625" cy="2247900"/>
+                      </a:xfrm>
+                      <a:prstGeom prst="rect">
+                        <a:avLst/>
+                      </a:prstGeom>
+                      <a:noFill/>
+                      <a:extLst>
+                        <a:ext uri="{909E8E84-426E-40DD-AFC4-6F175D3DCCD1}">
+                          <a14:hiddenFill xmlns:a14="http://schemas.microsoft.com/office/drawing/2010/main">
+                            <a:solidFill>
+                              <a:srgbClr val="FFFFFF"/>
+                            </a:solidFill>
+                          </a14:hiddenFill>
+                        </a:ext>
+                      </a:extLst>
+                    </p:spPr>
+                  </p:pic>
+                </p:oleObj>
+              </mc:Fallback>
+            </mc:AlternateContent>
+          </a:graphicData>
+        </a:graphic>
+      </p:graphicFrame>
+      <p:sp>
+        <p:nvSpPr>
+          <p:cNvPr id="6" name="Rectangle 4"/>
+          <p:cNvSpPr>
+            <a:spLocks noChangeArrowheads="1"/>
+          </p:cNvSpPr>
+          <p:nvPr/>
+        </p:nvSpPr>
+        <p:spPr bwMode="auto">
+          <a:xfrm>
+            <a:off x="0" y="0"/>
+            <a:ext cx="12192000" cy="0"/>
+          </a:xfrm>
+          <a:prstGeom prst="rect">
+            <a:avLst/>
+          </a:prstGeom>
+          <a:noFill/>
+          <a:ln>
+            <a:noFill/>
+          </a:ln>
+          <a:effectLst/>
+          <a:extLst>
+            <a:ext uri="{909E8E84-426E-40DD-AFC4-6F175D3DCCD1}">
+              <a14:hiddenFill xmlns:a14="http://schemas.microsoft.com/office/drawing/2010/main">
+                <a:solidFill>
+                  <a:schemeClr val="accent1"/>
+                </a:solidFill>
+              </a14:hiddenFill>
+            </a:ext>
+            <a:ext uri="{91240B29-F687-4F45-9708-019B960494DF}">
+              <a14:hiddenLine xmlns:a14="http://schemas.microsoft.com/office/drawing/2010/main" w="9525">
+                <a:solidFill>
+                  <a:schemeClr val="tx1"/>
+                </a:solidFill>
+                <a:miter lim="800000"/>
+                <a:headEnd/>
+                <a:tailEnd/>
+              </a14:hiddenLine>
+            </a:ext>
+            <a:ext uri="{AF507438-7753-43E0-B8FC-AC1667EBCBE1}">
+              <a14:hiddenEffects xmlns:a14="http://schemas.microsoft.com/office/drawing/2010/main">
+                <a:effectLst>
+                  <a:outerShdw dist="35921" dir="2700000" algn="ctr" rotWithShape="0">
+                    <a:schemeClr val="bg2"/>
+                  </a:outerShdw>
+                </a:effectLst>
+              </a14:hiddenEffects>
+            </a:ext>
+          </a:extLst>
+        </p:spPr>
+        <p:txBody>
+          <a:bodyPr vert="horz" wrap="none" lIns="91440" tIns="45720" rIns="91440" bIns="45720" numCol="1" anchor="ctr" anchorCtr="0" compatLnSpc="1">
+            <a:prstTxWarp prst="textNoShape">
+              <a:avLst/>
+            </a:prstTxWarp>
+            <a:spAutoFit/>
+          </a:bodyPr>
+          <a:lstStyle/>
+          <a:p>
+            <a:endParaRPr lang="de-DE" dirty="0"/>
+          </a:p>
+        </p:txBody>
+      </p:sp>
+      <p:graphicFrame>
+        <p:nvGraphicFramePr>
+          <p:cNvPr id="7" name="Objekt 6"/>
+          <p:cNvGraphicFramePr>
+            <a:graphicFrameLocks noChangeAspect="1"/>
+          </p:cNvGraphicFramePr>
+          <p:nvPr>
+            <p:extLst>
+              <p:ext uri="{D42A27DB-BD31-4B8C-83A1-F6EECF244321}">
+                <p14:modId xmlns:p14="http://schemas.microsoft.com/office/powerpoint/2010/main" val="1638669058"/>
+              </p:ext>
+            </p:extLst>
+          </p:nvPr>
+        </p:nvGraphicFramePr>
+        <p:xfrm>
+          <a:off x="6289675" y="3235325"/>
+          <a:ext cx="5748338" cy="2247900"/>
+        </p:xfrm>
+        <a:graphic>
+          <a:graphicData uri="http://schemas.openxmlformats.org/presentationml/2006/ole">
+            <mc:AlternateContent xmlns:mc="http://schemas.openxmlformats.org/markup-compatibility/2006">
+              <mc:Choice xmlns:v="urn:schemas-microsoft-com:vml" Requires="v">
+                <p:oleObj spid="_x0000_s2072" name="Dokument" r:id="rId5" imgW="5760720" imgH="2244600" progId="Word.OpenDocumentText.12">
+                  <p:embed/>
+                </p:oleObj>
+              </mc:Choice>
+              <mc:Fallback>
+                <p:oleObj name="Dokument" r:id="rId5" imgW="5760720" imgH="2244600" progId="Word.OpenDocumentText.12">
+                  <p:embed/>
+                  <p:pic>
+                    <p:nvPicPr>
+                      <p:cNvPr id="0" name="Object 3"/>
+                      <p:cNvPicPr>
+                        <a:picLocks noChangeAspect="1" noChangeArrowheads="1"/>
+                      </p:cNvPicPr>
+                      <p:nvPr/>
+                    </p:nvPicPr>
+                    <p:blipFill>
+                      <a:blip r:embed="rId6"/>
+                      <a:srcRect/>
+                      <a:stretch>
+                        <a:fillRect/>
+                      </a:stretch>
+                    </p:blipFill>
+                    <p:spPr bwMode="auto">
+                      <a:xfrm>
+                        <a:off x="6289675" y="3235325"/>
+                        <a:ext cx="5748338" cy="2247900"/>
+                      </a:xfrm>
+                      <a:prstGeom prst="rect">
+                        <a:avLst/>
+                      </a:prstGeom>
+                      <a:noFill/>
+                      <a:extLst>
+                        <a:ext uri="{909E8E84-426E-40DD-AFC4-6F175D3DCCD1}">
+                          <a14:hiddenFill xmlns:a14="http://schemas.microsoft.com/office/drawing/2010/main">
+                            <a:solidFill>
+                              <a:srgbClr val="FFFFFF"/>
+                            </a:solidFill>
+                          </a14:hiddenFill>
+                        </a:ext>
+                      </a:extLst>
+                    </p:spPr>
+                  </p:pic>
+                </p:oleObj>
+              </mc:Fallback>
+            </mc:AlternateContent>
+          </a:graphicData>
+        </a:graphic>
+      </p:graphicFrame>
+      <p:sp>
+        <p:nvSpPr>
+          <p:cNvPr id="8" name="Textfeld 7"/>
+          <p:cNvSpPr txBox="1"/>
+          <p:nvPr/>
+        </p:nvSpPr>
+        <p:spPr>
+          <a:xfrm>
+            <a:off x="875322" y="5152515"/>
+            <a:ext cx="2915139" cy="276999"/>
+          </a:xfrm>
+          <a:prstGeom prst="rect">
+            <a:avLst/>
+          </a:prstGeom>
+          <a:noFill/>
+        </p:spPr>
+        <p:txBody>
+          <a:bodyPr wrap="square" rtlCol="0">
+            <a:spAutoFit/>
+          </a:bodyPr>
+          <a:lstStyle/>
+          <a:p>
+            <a:r>
+              <a:rPr lang="de-DE" sz="1200" dirty="0" smtClean="0"/>
+              <a:t>Implementierung für eine flache Kopie</a:t>
+            </a:r>
+            <a:endParaRPr lang="de-DE" sz="1200" dirty="0"/>
+          </a:p>
+        </p:txBody>
+      </p:sp>
+      <p:sp>
+        <p:nvSpPr>
+          <p:cNvPr id="9" name="Textfeld 8"/>
+          <p:cNvSpPr txBox="1"/>
+          <p:nvPr/>
+        </p:nvSpPr>
+        <p:spPr>
+          <a:xfrm>
+            <a:off x="6287476" y="5152515"/>
+            <a:ext cx="2915139" cy="276999"/>
+          </a:xfrm>
+          <a:prstGeom prst="rect">
+            <a:avLst/>
+          </a:prstGeom>
+          <a:noFill/>
+        </p:spPr>
+        <p:txBody>
+          <a:bodyPr wrap="square" rtlCol="0">
+            <a:spAutoFit/>
+          </a:bodyPr>
+          <a:lstStyle/>
+          <a:p>
+            <a:r>
+              <a:rPr lang="de-DE" sz="1200" dirty="0" smtClean="0"/>
+              <a:t>Implementierung für eine tiefe Kopie</a:t>
+            </a:r>
+            <a:endParaRPr lang="de-DE" sz="1200" dirty="0"/>
           </a:p>
         </p:txBody>
       </p:sp>
     </p:spTree>
     <p:extLst>
       <p:ext uri="{BB962C8B-B14F-4D97-AF65-F5344CB8AC3E}">
-        <p14:creationId xmlns:p14="http://schemas.microsoft.com/office/powerpoint/2010/main" val="1583892773"/>
+        <p14:creationId xmlns:p14="http://schemas.microsoft.com/office/powerpoint/2010/main" val="3722473350"/>
       </p:ext>
     </p:extLst>
   </p:cSld>
   <p:clrMapOvr>
     <a:masterClrMapping/>
   </p:clrMapOvr>
+  <p:timing>
+    <p:tnLst>
+      <p:par>
+        <p:cTn id="1" dur="indefinite" restart="never" nodeType="tmRoot"/>
+      </p:par>
+    </p:tnLst>
+  </p:timing>
 </p:sld>
 </file>
 
@@ -4232,50 +5384,308 @@
           <a:lstStyle/>
           <a:p>
             <a:r>
-              <a:rPr lang="de-DE" dirty="0" err="1" smtClean="0"/>
-              <a:t>Copy</a:t>
-            </a:r>
-            <a:r>
               <a:rPr lang="de-DE" dirty="0" smtClean="0"/>
-              <a:t> </a:t>
-            </a:r>
-            <a:r>
-              <a:rPr lang="de-DE" dirty="0" err="1" smtClean="0"/>
-              <a:t>Constructor</a:t>
-            </a:r>
-            <a:endParaRPr lang="de-DE" dirty="0"/>
-          </a:p>
-        </p:txBody>
-      </p:sp>
-      <p:sp>
-        <p:nvSpPr>
-          <p:cNvPr id="3" name="Inhaltsplatzhalter 2"/>
-          <p:cNvSpPr>
-            <a:spLocks noGrp="1"/>
-          </p:cNvSpPr>
-          <p:nvPr>
-            <p:ph idx="1"/>
-          </p:nvPr>
-        </p:nvSpPr>
-        <p:spPr/>
-        <p:txBody>
-          <a:bodyPr/>
-          <a:lstStyle/>
-          <a:p>
-            <a:endParaRPr lang="de-DE"/>
-          </a:p>
-        </p:txBody>
-      </p:sp>
+              <a:t>Reflection</a:t>
+            </a:r>
+            <a:endParaRPr lang="de-DE" dirty="0"/>
+          </a:p>
+        </p:txBody>
+      </p:sp>
+      <p:sp>
+        <p:nvSpPr>
+          <p:cNvPr id="4" name="Rectangle 2"/>
+          <p:cNvSpPr>
+            <a:spLocks noChangeArrowheads="1"/>
+          </p:cNvSpPr>
+          <p:nvPr/>
+        </p:nvSpPr>
+        <p:spPr bwMode="auto">
+          <a:xfrm>
+            <a:off x="0" y="0"/>
+            <a:ext cx="12192000" cy="0"/>
+          </a:xfrm>
+          <a:prstGeom prst="rect">
+            <a:avLst/>
+          </a:prstGeom>
+          <a:noFill/>
+          <a:ln>
+            <a:noFill/>
+          </a:ln>
+          <a:effectLst/>
+          <a:extLst>
+            <a:ext uri="{909E8E84-426E-40DD-AFC4-6F175D3DCCD1}">
+              <a14:hiddenFill xmlns:a14="http://schemas.microsoft.com/office/drawing/2010/main">
+                <a:solidFill>
+                  <a:schemeClr val="accent1"/>
+                </a:solidFill>
+              </a14:hiddenFill>
+            </a:ext>
+            <a:ext uri="{91240B29-F687-4F45-9708-019B960494DF}">
+              <a14:hiddenLine xmlns:a14="http://schemas.microsoft.com/office/drawing/2010/main" w="9525">
+                <a:solidFill>
+                  <a:schemeClr val="tx1"/>
+                </a:solidFill>
+                <a:miter lim="800000"/>
+                <a:headEnd/>
+                <a:tailEnd/>
+              </a14:hiddenLine>
+            </a:ext>
+            <a:ext uri="{AF507438-7753-43E0-B8FC-AC1667EBCBE1}">
+              <a14:hiddenEffects xmlns:a14="http://schemas.microsoft.com/office/drawing/2010/main">
+                <a:effectLst>
+                  <a:outerShdw dist="35921" dir="2700000" algn="ctr" rotWithShape="0">
+                    <a:schemeClr val="bg2"/>
+                  </a:outerShdw>
+                </a:effectLst>
+              </a14:hiddenEffects>
+            </a:ext>
+          </a:extLst>
+        </p:spPr>
+        <p:txBody>
+          <a:bodyPr vert="horz" wrap="none" lIns="91440" tIns="45720" rIns="91440" bIns="45720" numCol="1" anchor="ctr" anchorCtr="0" compatLnSpc="1">
+            <a:prstTxWarp prst="textNoShape">
+              <a:avLst/>
+            </a:prstTxWarp>
+            <a:spAutoFit/>
+          </a:bodyPr>
+          <a:lstStyle/>
+          <a:p>
+            <a:endParaRPr lang="de-DE" dirty="0"/>
+          </a:p>
+        </p:txBody>
+      </p:sp>
+      <p:graphicFrame>
+        <p:nvGraphicFramePr>
+          <p:cNvPr id="5" name="Objekt 4"/>
+          <p:cNvGraphicFramePr>
+            <a:graphicFrameLocks noChangeAspect="1"/>
+          </p:cNvGraphicFramePr>
+          <p:nvPr>
+            <p:extLst>
+              <p:ext uri="{D42A27DB-BD31-4B8C-83A1-F6EECF244321}">
+                <p14:modId xmlns:p14="http://schemas.microsoft.com/office/powerpoint/2010/main" val="1427476527"/>
+              </p:ext>
+            </p:extLst>
+          </p:nvPr>
+        </p:nvGraphicFramePr>
+        <p:xfrm>
+          <a:off x="2868246" y="1703754"/>
+          <a:ext cx="5762625" cy="1781175"/>
+        </p:xfrm>
+        <a:graphic>
+          <a:graphicData uri="http://schemas.openxmlformats.org/presentationml/2006/ole">
+            <mc:AlternateContent xmlns:mc="http://schemas.openxmlformats.org/markup-compatibility/2006">
+              <mc:Choice xmlns:v="urn:schemas-microsoft-com:vml" Requires="v">
+                <p:oleObj spid="_x0000_s3093" name="Dokument" r:id="rId3" imgW="5775241" imgH="1787727" progId="Word.OpenDocumentText.12">
+                  <p:embed/>
+                </p:oleObj>
+              </mc:Choice>
+              <mc:Fallback>
+                <p:oleObj name="Dokument" r:id="rId3" imgW="5775241" imgH="1787727" progId="Word.OpenDocumentText.12">
+                  <p:embed/>
+                  <p:pic>
+                    <p:nvPicPr>
+                      <p:cNvPr id="0" name="Object 1"/>
+                      <p:cNvPicPr>
+                        <a:picLocks noChangeAspect="1" noChangeArrowheads="1"/>
+                      </p:cNvPicPr>
+                      <p:nvPr/>
+                    </p:nvPicPr>
+                    <p:blipFill>
+                      <a:blip r:embed="rId4">
+                        <a:extLst>
+                          <a:ext uri="{28A0092B-C50C-407E-A947-70E740481C1C}">
+                            <a14:useLocalDpi xmlns:a14="http://schemas.microsoft.com/office/drawing/2010/main" val="0"/>
+                          </a:ext>
+                        </a:extLst>
+                      </a:blip>
+                      <a:srcRect/>
+                      <a:stretch>
+                        <a:fillRect/>
+                      </a:stretch>
+                    </p:blipFill>
+                    <p:spPr bwMode="auto">
+                      <a:xfrm>
+                        <a:off x="2868246" y="1703754"/>
+                        <a:ext cx="5762625" cy="1781175"/>
+                      </a:xfrm>
+                      <a:prstGeom prst="rect">
+                        <a:avLst/>
+                      </a:prstGeom>
+                      <a:noFill/>
+                      <a:extLst>
+                        <a:ext uri="{909E8E84-426E-40DD-AFC4-6F175D3DCCD1}">
+                          <a14:hiddenFill xmlns:a14="http://schemas.microsoft.com/office/drawing/2010/main">
+                            <a:solidFill>
+                              <a:srgbClr val="FFFFFF"/>
+                            </a:solidFill>
+                          </a14:hiddenFill>
+                        </a:ext>
+                      </a:extLst>
+                    </p:spPr>
+                  </p:pic>
+                </p:oleObj>
+              </mc:Fallback>
+            </mc:AlternateContent>
+          </a:graphicData>
+        </a:graphic>
+      </p:graphicFrame>
+      <p:sp>
+        <p:nvSpPr>
+          <p:cNvPr id="6" name="Rectangle 4"/>
+          <p:cNvSpPr>
+            <a:spLocks noChangeArrowheads="1"/>
+          </p:cNvSpPr>
+          <p:nvPr/>
+        </p:nvSpPr>
+        <p:spPr bwMode="auto">
+          <a:xfrm>
+            <a:off x="0" y="0"/>
+            <a:ext cx="12192000" cy="0"/>
+          </a:xfrm>
+          <a:prstGeom prst="rect">
+            <a:avLst/>
+          </a:prstGeom>
+          <a:noFill/>
+          <a:ln>
+            <a:noFill/>
+          </a:ln>
+          <a:effectLst/>
+          <a:extLst>
+            <a:ext uri="{909E8E84-426E-40DD-AFC4-6F175D3DCCD1}">
+              <a14:hiddenFill xmlns:a14="http://schemas.microsoft.com/office/drawing/2010/main">
+                <a:solidFill>
+                  <a:schemeClr val="accent1"/>
+                </a:solidFill>
+              </a14:hiddenFill>
+            </a:ext>
+            <a:ext uri="{91240B29-F687-4F45-9708-019B960494DF}">
+              <a14:hiddenLine xmlns:a14="http://schemas.microsoft.com/office/drawing/2010/main" w="9525">
+                <a:solidFill>
+                  <a:schemeClr val="tx1"/>
+                </a:solidFill>
+                <a:miter lim="800000"/>
+                <a:headEnd/>
+                <a:tailEnd/>
+              </a14:hiddenLine>
+            </a:ext>
+            <a:ext uri="{AF507438-7753-43E0-B8FC-AC1667EBCBE1}">
+              <a14:hiddenEffects xmlns:a14="http://schemas.microsoft.com/office/drawing/2010/main">
+                <a:effectLst>
+                  <a:outerShdw dist="35921" dir="2700000" algn="ctr" rotWithShape="0">
+                    <a:schemeClr val="bg2"/>
+                  </a:outerShdw>
+                </a:effectLst>
+              </a14:hiddenEffects>
+            </a:ext>
+          </a:extLst>
+        </p:spPr>
+        <p:txBody>
+          <a:bodyPr vert="horz" wrap="none" lIns="91440" tIns="45720" rIns="91440" bIns="45720" numCol="1" anchor="ctr" anchorCtr="0" compatLnSpc="1">
+            <a:prstTxWarp prst="textNoShape">
+              <a:avLst/>
+            </a:prstTxWarp>
+            <a:spAutoFit/>
+          </a:bodyPr>
+          <a:lstStyle/>
+          <a:p>
+            <a:endParaRPr lang="de-DE" dirty="0"/>
+          </a:p>
+        </p:txBody>
+      </p:sp>
+      <p:graphicFrame>
+        <p:nvGraphicFramePr>
+          <p:cNvPr id="7" name="Objekt 6"/>
+          <p:cNvGraphicFramePr>
+            <a:graphicFrameLocks noChangeAspect="1"/>
+          </p:cNvGraphicFramePr>
+          <p:nvPr>
+            <p:extLst>
+              <p:ext uri="{D42A27DB-BD31-4B8C-83A1-F6EECF244321}">
+                <p14:modId xmlns:p14="http://schemas.microsoft.com/office/powerpoint/2010/main" val="671194796"/>
+              </p:ext>
+            </p:extLst>
+          </p:nvPr>
+        </p:nvGraphicFramePr>
+        <p:xfrm>
+          <a:off x="2805724" y="3430954"/>
+          <a:ext cx="5762625" cy="2952750"/>
+        </p:xfrm>
+        <a:graphic>
+          <a:graphicData uri="http://schemas.openxmlformats.org/presentationml/2006/ole">
+            <mc:AlternateContent xmlns:mc="http://schemas.openxmlformats.org/markup-compatibility/2006">
+              <mc:Choice xmlns:v="urn:schemas-microsoft-com:vml" Requires="v">
+                <p:oleObj spid="_x0000_s3094" name="Dokument" r:id="rId5" imgW="5775241" imgH="2957069" progId="Word.OpenDocumentText.12">
+                  <p:embed/>
+                </p:oleObj>
+              </mc:Choice>
+              <mc:Fallback>
+                <p:oleObj name="Dokument" r:id="rId5" imgW="5775241" imgH="2957069" progId="Word.OpenDocumentText.12">
+                  <p:embed/>
+                  <p:pic>
+                    <p:nvPicPr>
+                      <p:cNvPr id="0" name="Object 3"/>
+                      <p:cNvPicPr>
+                        <a:picLocks noChangeAspect="1" noChangeArrowheads="1"/>
+                      </p:cNvPicPr>
+                      <p:nvPr/>
+                    </p:nvPicPr>
+                    <p:blipFill>
+                      <a:blip r:embed="rId6">
+                        <a:extLst>
+                          <a:ext uri="{28A0092B-C50C-407E-A947-70E740481C1C}">
+                            <a14:useLocalDpi xmlns:a14="http://schemas.microsoft.com/office/drawing/2010/main" val="0"/>
+                          </a:ext>
+                        </a:extLst>
+                      </a:blip>
+                      <a:srcRect/>
+                      <a:stretch>
+                        <a:fillRect/>
+                      </a:stretch>
+                    </p:blipFill>
+                    <p:spPr bwMode="auto">
+                      <a:xfrm>
+                        <a:off x="2805724" y="3430954"/>
+                        <a:ext cx="5762625" cy="2952750"/>
+                      </a:xfrm>
+                      <a:prstGeom prst="rect">
+                        <a:avLst/>
+                      </a:prstGeom>
+                      <a:noFill/>
+                      <a:extLst>
+                        <a:ext uri="{909E8E84-426E-40DD-AFC4-6F175D3DCCD1}">
+                          <a14:hiddenFill xmlns:a14="http://schemas.microsoft.com/office/drawing/2010/main">
+                            <a:solidFill>
+                              <a:srgbClr val="FFFFFF"/>
+                            </a:solidFill>
+                          </a14:hiddenFill>
+                        </a:ext>
+                      </a:extLst>
+                    </p:spPr>
+                  </p:pic>
+                </p:oleObj>
+              </mc:Fallback>
+            </mc:AlternateContent>
+          </a:graphicData>
+        </a:graphic>
+      </p:graphicFrame>
     </p:spTree>
     <p:extLst>
       <p:ext uri="{BB962C8B-B14F-4D97-AF65-F5344CB8AC3E}">
-        <p14:creationId xmlns:p14="http://schemas.microsoft.com/office/powerpoint/2010/main" val="3722473350"/>
+        <p14:creationId xmlns:p14="http://schemas.microsoft.com/office/powerpoint/2010/main" val="887009574"/>
       </p:ext>
     </p:extLst>
   </p:cSld>
   <p:clrMapOvr>
     <a:masterClrMapping/>
   </p:clrMapOvr>
+  <p:timing>
+    <p:tnLst>
+      <p:par>
+        <p:cTn id="1" dur="indefinite" restart="never" nodeType="tmRoot"/>
+      </p:par>
+    </p:tnLst>
+  </p:timing>
 </p:sld>
 </file>
 
@@ -4312,8 +5722,12 @@
           <a:lstStyle/>
           <a:p>
             <a:r>
-              <a:rPr lang="de-DE" dirty="0" err="1" smtClean="0"/>
-              <a:t>Reflection</a:t>
+              <a:rPr lang="de-DE" dirty="0" smtClean="0"/>
+              <a:t>Bean </a:t>
+            </a:r>
+            <a:r>
+              <a:rPr lang="de-DE" dirty="0" smtClean="0"/>
+              <a:t>Utils</a:t>
             </a:r>
             <a:endParaRPr lang="de-DE" dirty="0"/>
           </a:p>
@@ -4334,20 +5748,194 @@
           <a:bodyPr/>
           <a:lstStyle/>
           <a:p>
-            <a:endParaRPr lang="de-DE"/>
-          </a:p>
-        </p:txBody>
-      </p:sp>
+            <a:r>
+              <a:rPr lang="de-DE" dirty="0" smtClean="0"/>
+              <a:t>Erzeugt flache Kopie </a:t>
+            </a:r>
+          </a:p>
+          <a:p>
+            <a:r>
+              <a:rPr lang="de-DE" dirty="0" smtClean="0"/>
+              <a:t>Kein </a:t>
+            </a:r>
+            <a:r>
+              <a:rPr lang="de-DE" dirty="0" smtClean="0"/>
+              <a:t>Cloneable</a:t>
+            </a:r>
+            <a:r>
+              <a:rPr lang="de-DE" dirty="0" smtClean="0"/>
+              <a:t> Interface nötig</a:t>
+            </a:r>
+          </a:p>
+          <a:p>
+            <a:r>
+              <a:rPr lang="de-DE" dirty="0" smtClean="0"/>
+              <a:t>Aus Apache </a:t>
+            </a:r>
+            <a:r>
+              <a:rPr lang="de-DE" dirty="0" smtClean="0"/>
+              <a:t>Commons</a:t>
+            </a:r>
+            <a:endParaRPr lang="de-DE" dirty="0" smtClean="0"/>
+          </a:p>
+        </p:txBody>
+      </p:sp>
+      <p:sp>
+        <p:nvSpPr>
+          <p:cNvPr id="4" name="Rectangle 2"/>
+          <p:cNvSpPr>
+            <a:spLocks noChangeArrowheads="1"/>
+          </p:cNvSpPr>
+          <p:nvPr/>
+        </p:nvSpPr>
+        <p:spPr bwMode="auto">
+          <a:xfrm>
+            <a:off x="0" y="0"/>
+            <a:ext cx="12192000" cy="0"/>
+          </a:xfrm>
+          <a:prstGeom prst="rect">
+            <a:avLst/>
+          </a:prstGeom>
+          <a:noFill/>
+          <a:ln>
+            <a:noFill/>
+          </a:ln>
+          <a:effectLst/>
+          <a:extLst>
+            <a:ext uri="{909E8E84-426E-40DD-AFC4-6F175D3DCCD1}">
+              <a14:hiddenFill xmlns:a14="http://schemas.microsoft.com/office/drawing/2010/main">
+                <a:solidFill>
+                  <a:schemeClr val="accent1"/>
+                </a:solidFill>
+              </a14:hiddenFill>
+            </a:ext>
+            <a:ext uri="{91240B29-F687-4F45-9708-019B960494DF}">
+              <a14:hiddenLine xmlns:a14="http://schemas.microsoft.com/office/drawing/2010/main" w="9525">
+                <a:solidFill>
+                  <a:schemeClr val="tx1"/>
+                </a:solidFill>
+                <a:miter lim="800000"/>
+                <a:headEnd/>
+                <a:tailEnd/>
+              </a14:hiddenLine>
+            </a:ext>
+            <a:ext uri="{AF507438-7753-43E0-B8FC-AC1667EBCBE1}">
+              <a14:hiddenEffects xmlns:a14="http://schemas.microsoft.com/office/drawing/2010/main">
+                <a:effectLst>
+                  <a:outerShdw dist="35921" dir="2700000" algn="ctr" rotWithShape="0">
+                    <a:schemeClr val="bg2"/>
+                  </a:outerShdw>
+                </a:effectLst>
+              </a14:hiddenEffects>
+            </a:ext>
+          </a:extLst>
+        </p:spPr>
+        <p:txBody>
+          <a:bodyPr vert="horz" wrap="none" lIns="91440" tIns="45720" rIns="91440" bIns="45720" numCol="1" anchor="ctr" anchorCtr="0" compatLnSpc="1">
+            <a:prstTxWarp prst="textNoShape">
+              <a:avLst/>
+            </a:prstTxWarp>
+            <a:spAutoFit/>
+          </a:bodyPr>
+          <a:lstStyle/>
+          <a:p>
+            <a:endParaRPr lang="de-DE" dirty="0"/>
+          </a:p>
+        </p:txBody>
+      </p:sp>
+      <p:graphicFrame>
+        <p:nvGraphicFramePr>
+          <p:cNvPr id="5" name="Objekt 4"/>
+          <p:cNvGraphicFramePr>
+            <a:graphicFrameLocks noChangeAspect="1"/>
+          </p:cNvGraphicFramePr>
+          <p:nvPr>
+            <p:extLst>
+              <p:ext uri="{D42A27DB-BD31-4B8C-83A1-F6EECF244321}">
+                <p14:modId xmlns:p14="http://schemas.microsoft.com/office/powerpoint/2010/main" val="2773247232"/>
+              </p:ext>
+            </p:extLst>
+          </p:nvPr>
+        </p:nvGraphicFramePr>
+        <p:xfrm>
+          <a:off x="2876061" y="3899877"/>
+          <a:ext cx="5762625" cy="762000"/>
+        </p:xfrm>
+        <a:graphic>
+          <a:graphicData uri="http://schemas.openxmlformats.org/presentationml/2006/ole">
+            <mc:AlternateContent xmlns:mc="http://schemas.openxmlformats.org/markup-compatibility/2006">
+              <mc:Choice xmlns:v="urn:schemas-microsoft-com:vml" Requires="v">
+                <p:oleObj spid="_x0000_s4107" name="Dokument" r:id="rId3" imgW="5775241" imgH="761533" progId="Word.OpenDocumentText.12">
+                  <p:embed/>
+                </p:oleObj>
+              </mc:Choice>
+              <mc:Fallback>
+                <p:oleObj name="Dokument" r:id="rId3" imgW="5775241" imgH="761533" progId="Word.OpenDocumentText.12">
+                  <p:embed/>
+                  <p:pic>
+                    <p:nvPicPr>
+                      <p:cNvPr id="0" name="Object 1"/>
+                      <p:cNvPicPr>
+                        <a:picLocks noChangeAspect="1" noChangeArrowheads="1"/>
+                      </p:cNvPicPr>
+                      <p:nvPr/>
+                    </p:nvPicPr>
+                    <p:blipFill>
+                      <a:blip r:embed="rId4">
+                        <a:extLst>
+                          <a:ext uri="{28A0092B-C50C-407E-A947-70E740481C1C}">
+                            <a14:useLocalDpi xmlns:a14="http://schemas.microsoft.com/office/drawing/2010/main" val="0"/>
+                          </a:ext>
+                        </a:extLst>
+                      </a:blip>
+                      <a:srcRect/>
+                      <a:stretch>
+                        <a:fillRect/>
+                      </a:stretch>
+                    </p:blipFill>
+                    <p:spPr bwMode="auto">
+                      <a:xfrm>
+                        <a:off x="2876061" y="3899877"/>
+                        <a:ext cx="5762625" cy="762000"/>
+                      </a:xfrm>
+                      <a:prstGeom prst="rect">
+                        <a:avLst/>
+                      </a:prstGeom>
+                      <a:noFill/>
+                      <a:extLst>
+                        <a:ext uri="{909E8E84-426E-40DD-AFC4-6F175D3DCCD1}">
+                          <a14:hiddenFill xmlns:a14="http://schemas.microsoft.com/office/drawing/2010/main">
+                            <a:solidFill>
+                              <a:srgbClr val="FFFFFF"/>
+                            </a:solidFill>
+                          </a14:hiddenFill>
+                        </a:ext>
+                      </a:extLst>
+                    </p:spPr>
+                  </p:pic>
+                </p:oleObj>
+              </mc:Fallback>
+            </mc:AlternateContent>
+          </a:graphicData>
+        </a:graphic>
+      </p:graphicFrame>
     </p:spTree>
     <p:extLst>
       <p:ext uri="{BB962C8B-B14F-4D97-AF65-F5344CB8AC3E}">
-        <p14:creationId xmlns:p14="http://schemas.microsoft.com/office/powerpoint/2010/main" val="887009574"/>
+        <p14:creationId xmlns:p14="http://schemas.microsoft.com/office/powerpoint/2010/main" val="2522149349"/>
       </p:ext>
     </p:extLst>
   </p:cSld>
   <p:clrMapOvr>
     <a:masterClrMapping/>
   </p:clrMapOvr>
+  <p:timing>
+    <p:tnLst>
+      <p:par>
+        <p:cTn id="1" dur="indefinite" restart="never" nodeType="tmRoot"/>
+      </p:par>
+    </p:tnLst>
+  </p:timing>
 </p:sld>
 </file>
 
@@ -4406,7 +5994,7 @@
           <a:bodyPr/>
           <a:lstStyle/>
           <a:p>
-            <a:endParaRPr lang="de-DE"/>
+            <a:endParaRPr lang="de-DE" dirty="0"/>
           </a:p>
         </p:txBody>
       </p:sp>
@@ -4420,13 +6008,20 @@
   <p:clrMapOvr>
     <a:masterClrMapping/>
   </p:clrMapOvr>
+  <p:timing>
+    <p:tnLst>
+      <p:par>
+        <p:cTn id="1" dur="indefinite" restart="never" nodeType="tmRoot"/>
+      </p:par>
+    </p:tnLst>
+  </p:timing>
 </p:sld>
 </file>
 
 <file path=ppt/theme/theme1.xml><?xml version="1.0" encoding="utf-8"?>
-<a:theme xmlns:a="http://schemas.openxmlformats.org/drawingml/2006/main" name="Office">
+<a:theme xmlns:a="http://schemas.openxmlformats.org/drawingml/2006/main" name="Larissa">
   <a:themeElements>
-    <a:clrScheme name="Office">
+    <a:clrScheme name="Larissa">
       <a:dk1>
         <a:sysClr val="windowText" lastClr="000000"/>
       </a:dk1>
@@ -4434,44 +6029,44 @@
         <a:sysClr val="window" lastClr="FFFFFF"/>
       </a:lt1>
       <a:dk2>
-        <a:srgbClr val="44546A"/>
+        <a:srgbClr val="1F497D"/>
       </a:dk2>
       <a:lt2>
-        <a:srgbClr val="E7E6E6"/>
+        <a:srgbClr val="EEECE1"/>
       </a:lt2>
       <a:accent1>
-        <a:srgbClr val="5B9BD5"/>
+        <a:srgbClr val="4F81BD"/>
       </a:accent1>
       <a:accent2>
-        <a:srgbClr val="ED7D31"/>
+        <a:srgbClr val="C0504D"/>
       </a:accent2>
       <a:accent3>
-        <a:srgbClr val="A5A5A5"/>
+        <a:srgbClr val="9BBB59"/>
       </a:accent3>
       <a:accent4>
-        <a:srgbClr val="FFC000"/>
+        <a:srgbClr val="8064A2"/>
       </a:accent4>
       <a:accent5>
-        <a:srgbClr val="4472C4"/>
+        <a:srgbClr val="4BACC6"/>
       </a:accent5>
       <a:accent6>
-        <a:srgbClr val="70AD47"/>
+        <a:srgbClr val="F79646"/>
       </a:accent6>
       <a:hlink>
-        <a:srgbClr val="0563C1"/>
+        <a:srgbClr val="0000FF"/>
       </a:hlink>
       <a:folHlink>
-        <a:srgbClr val="954F72"/>
+        <a:srgbClr val="800080"/>
       </a:folHlink>
     </a:clrScheme>
-    <a:fontScheme name="Office">
+    <a:fontScheme name="Larissa">
       <a:majorFont>
-        <a:latin typeface="Calibri Light" panose="020F0302020204030204"/>
+        <a:latin typeface="Calibri"/>
         <a:ea typeface=""/>
         <a:cs typeface=""/>
-        <a:font script="Jpan" typeface="游ゴシック Light"/>
+        <a:font script="Jpan" typeface="ＭＳ Ｐゴシック"/>
         <a:font script="Hang" typeface="맑은 고딕"/>
-        <a:font script="Hans" typeface="等线 Light"/>
+        <a:font script="Hans" typeface="宋体"/>
         <a:font script="Hant" typeface="新細明體"/>
         <a:font script="Arab" typeface="Times New Roman"/>
         <a:font script="Hebr" typeface="Times New Roman"/>
@@ -4499,31 +6094,14 @@
         <a:font script="Viet" typeface="Times New Roman"/>
         <a:font script="Uigh" typeface="Microsoft Uighur"/>
         <a:font script="Geor" typeface="Sylfaen"/>
-        <a:font script="Armn" typeface="Arial"/>
-        <a:font script="Bugi" typeface="Leelawadee UI"/>
-        <a:font script="Bopo" typeface="Microsoft JhengHei"/>
-        <a:font script="Java" typeface="Javanese Text"/>
-        <a:font script="Lisu" typeface="Segoe UI"/>
-        <a:font script="Mymr" typeface="Myanmar Text"/>
-        <a:font script="Nkoo" typeface="Ebrima"/>
-        <a:font script="Olck" typeface="Nirmala UI"/>
-        <a:font script="Osma" typeface="Ebrima"/>
-        <a:font script="Phag" typeface="Phagspa"/>
-        <a:font script="Syrn" typeface="Estrangelo Edessa"/>
-        <a:font script="Syrj" typeface="Estrangelo Edessa"/>
-        <a:font script="Syre" typeface="Estrangelo Edessa"/>
-        <a:font script="Sora" typeface="Nirmala UI"/>
-        <a:font script="Tale" typeface="Microsoft Tai Le"/>
-        <a:font script="Talu" typeface="Microsoft New Tai Lue"/>
-        <a:font script="Tfng" typeface="Ebrima"/>
       </a:majorFont>
       <a:minorFont>
-        <a:latin typeface="Calibri" panose="020F0502020204030204"/>
+        <a:latin typeface="Calibri"/>
         <a:ea typeface=""/>
         <a:cs typeface=""/>
-        <a:font script="Jpan" typeface="游ゴシック"/>
+        <a:font script="Jpan" typeface="ＭＳ Ｐゴシック"/>
         <a:font script="Hang" typeface="맑은 고딕"/>
-        <a:font script="Hans" typeface="等线"/>
+        <a:font script="Hans" typeface="宋体"/>
         <a:font script="Hant" typeface="新細明體"/>
         <a:font script="Arab" typeface="Arial"/>
         <a:font script="Hebr" typeface="Arial"/>
@@ -4551,26 +6129,9 @@
         <a:font script="Viet" typeface="Arial"/>
         <a:font script="Uigh" typeface="Microsoft Uighur"/>
         <a:font script="Geor" typeface="Sylfaen"/>
-        <a:font script="Armn" typeface="Arial"/>
-        <a:font script="Bugi" typeface="Leelawadee UI"/>
-        <a:font script="Bopo" typeface="Microsoft JhengHei"/>
-        <a:font script="Java" typeface="Javanese Text"/>
-        <a:font script="Lisu" typeface="Segoe UI"/>
-        <a:font script="Mymr" typeface="Myanmar Text"/>
-        <a:font script="Nkoo" typeface="Ebrima"/>
-        <a:font script="Olck" typeface="Nirmala UI"/>
-        <a:font script="Osma" typeface="Ebrima"/>
-        <a:font script="Phag" typeface="Phagspa"/>
-        <a:font script="Syrn" typeface="Estrangelo Edessa"/>
-        <a:font script="Syrj" typeface="Estrangelo Edessa"/>
-        <a:font script="Syre" typeface="Estrangelo Edessa"/>
-        <a:font script="Sora" typeface="Nirmala UI"/>
-        <a:font script="Tale" typeface="Microsoft Tai Le"/>
-        <a:font script="Talu" typeface="Microsoft New Tai Lue"/>
-        <a:font script="Tfng" typeface="Ebrima"/>
       </a:minorFont>
     </a:fontScheme>
-    <a:fmtScheme name="Office">
+    <a:fmtScheme name="Larissa">
       <a:fillStyleLst>
         <a:solidFill>
           <a:schemeClr val="phClr"/>
@@ -4579,142 +6140,166 @@
           <a:gsLst>
             <a:gs pos="0">
               <a:schemeClr val="phClr">
-                <a:lumMod val="110000"/>
-                <a:satMod val="105000"/>
-                <a:tint val="67000"/>
+                <a:tint val="50000"/>
+                <a:satMod val="300000"/>
               </a:schemeClr>
             </a:gs>
-            <a:gs pos="50000">
+            <a:gs pos="35000">
               <a:schemeClr val="phClr">
-                <a:lumMod val="105000"/>
-                <a:satMod val="103000"/>
-                <a:tint val="73000"/>
+                <a:tint val="37000"/>
+                <a:satMod val="300000"/>
               </a:schemeClr>
             </a:gs>
             <a:gs pos="100000">
               <a:schemeClr val="phClr">
-                <a:lumMod val="105000"/>
-                <a:satMod val="109000"/>
-                <a:tint val="81000"/>
+                <a:tint val="15000"/>
+                <a:satMod val="350000"/>
               </a:schemeClr>
             </a:gs>
           </a:gsLst>
-          <a:lin ang="5400000" scaled="0"/>
+          <a:lin ang="16200000" scaled="1"/>
         </a:gradFill>
         <a:gradFill rotWithShape="1">
           <a:gsLst>
             <a:gs pos="0">
               <a:schemeClr val="phClr">
-                <a:satMod val="103000"/>
-                <a:lumMod val="102000"/>
-                <a:tint val="94000"/>
+                <a:shade val="51000"/>
+                <a:satMod val="130000"/>
               </a:schemeClr>
             </a:gs>
-            <a:gs pos="50000">
+            <a:gs pos="80000">
               <a:schemeClr val="phClr">
-                <a:satMod val="110000"/>
-                <a:lumMod val="100000"/>
-                <a:shade val="100000"/>
+                <a:shade val="93000"/>
+                <a:satMod val="130000"/>
               </a:schemeClr>
             </a:gs>
             <a:gs pos="100000">
               <a:schemeClr val="phClr">
-                <a:lumMod val="99000"/>
-                <a:satMod val="120000"/>
-                <a:shade val="78000"/>
+                <a:shade val="94000"/>
+                <a:satMod val="135000"/>
               </a:schemeClr>
             </a:gs>
           </a:gsLst>
-          <a:lin ang="5400000" scaled="0"/>
+          <a:lin ang="16200000" scaled="0"/>
         </a:gradFill>
       </a:fillStyleLst>
       <a:lnStyleLst>
-        <a:ln w="6350" cap="flat" cmpd="sng" algn="ctr">
+        <a:ln w="9525" cap="flat" cmpd="sng" algn="ctr">
+          <a:solidFill>
+            <a:schemeClr val="phClr">
+              <a:shade val="95000"/>
+              <a:satMod val="105000"/>
+            </a:schemeClr>
+          </a:solidFill>
+          <a:prstDash val="solid"/>
+        </a:ln>
+        <a:ln w="25400" cap="flat" cmpd="sng" algn="ctr">
           <a:solidFill>
             <a:schemeClr val="phClr"/>
           </a:solidFill>
           <a:prstDash val="solid"/>
-          <a:miter lim="800000"/>
         </a:ln>
-        <a:ln w="12700" cap="flat" cmpd="sng" algn="ctr">
+        <a:ln w="38100" cap="flat" cmpd="sng" algn="ctr">
           <a:solidFill>
             <a:schemeClr val="phClr"/>
           </a:solidFill>
           <a:prstDash val="solid"/>
-          <a:miter lim="800000"/>
-        </a:ln>
-        <a:ln w="19050" cap="flat" cmpd="sng" algn="ctr">
-          <a:solidFill>
-            <a:schemeClr val="phClr"/>
-          </a:solidFill>
-          <a:prstDash val="solid"/>
-          <a:miter lim="800000"/>
         </a:ln>
       </a:lnStyleLst>
       <a:effectStyleLst>
         <a:effectStyle>
-          <a:effectLst/>
-        </a:effectStyle>
-        <a:effectStyle>
-          <a:effectLst/>
+          <a:effectLst>
+            <a:outerShdw blurRad="40000" dist="20000" dir="5400000" rotWithShape="0">
+              <a:srgbClr val="000000">
+                <a:alpha val="38000"/>
+              </a:srgbClr>
+            </a:outerShdw>
+          </a:effectLst>
         </a:effectStyle>
         <a:effectStyle>
           <a:effectLst>
-            <a:outerShdw blurRad="57150" dist="19050" dir="5400000" algn="ctr" rotWithShape="0">
+            <a:outerShdw blurRad="40000" dist="23000" dir="5400000" rotWithShape="0">
               <a:srgbClr val="000000">
-                <a:alpha val="63000"/>
+                <a:alpha val="35000"/>
               </a:srgbClr>
             </a:outerShdw>
           </a:effectLst>
+        </a:effectStyle>
+        <a:effectStyle>
+          <a:effectLst>
+            <a:outerShdw blurRad="40000" dist="23000" dir="5400000" rotWithShape="0">
+              <a:srgbClr val="000000">
+                <a:alpha val="35000"/>
+              </a:srgbClr>
+            </a:outerShdw>
+          </a:effectLst>
+          <a:scene3d>
+            <a:camera prst="orthographicFront">
+              <a:rot lat="0" lon="0" rev="0"/>
+            </a:camera>
+            <a:lightRig rig="threePt" dir="t">
+              <a:rot lat="0" lon="0" rev="1200000"/>
+            </a:lightRig>
+          </a:scene3d>
+          <a:sp3d>
+            <a:bevelT w="63500" h="25400"/>
+          </a:sp3d>
         </a:effectStyle>
       </a:effectStyleLst>
       <a:bgFillStyleLst>
         <a:solidFill>
           <a:schemeClr val="phClr"/>
         </a:solidFill>
-        <a:solidFill>
-          <a:schemeClr val="phClr">
-            <a:tint val="95000"/>
-            <a:satMod val="170000"/>
-          </a:schemeClr>
-        </a:solidFill>
         <a:gradFill rotWithShape="1">
           <a:gsLst>
             <a:gs pos="0">
               <a:schemeClr val="phClr">
-                <a:tint val="93000"/>
-                <a:satMod val="150000"/>
-                <a:shade val="98000"/>
-                <a:lumMod val="102000"/>
+                <a:tint val="40000"/>
+                <a:satMod val="350000"/>
               </a:schemeClr>
             </a:gs>
-            <a:gs pos="50000">
+            <a:gs pos="40000">
               <a:schemeClr val="phClr">
-                <a:tint val="98000"/>
-                <a:satMod val="130000"/>
-                <a:shade val="90000"/>
-                <a:lumMod val="103000"/>
+                <a:tint val="45000"/>
+                <a:shade val="99000"/>
+                <a:satMod val="350000"/>
               </a:schemeClr>
             </a:gs>
             <a:gs pos="100000">
               <a:schemeClr val="phClr">
-                <a:shade val="63000"/>
-                <a:satMod val="120000"/>
+                <a:shade val="20000"/>
+                <a:satMod val="255000"/>
               </a:schemeClr>
             </a:gs>
           </a:gsLst>
-          <a:lin ang="5400000" scaled="0"/>
+          <a:path path="circle">
+            <a:fillToRect l="50000" t="-80000" r="50000" b="180000"/>
+          </a:path>
+        </a:gradFill>
+        <a:gradFill rotWithShape="1">
+          <a:gsLst>
+            <a:gs pos="0">
+              <a:schemeClr val="phClr">
+                <a:tint val="80000"/>
+                <a:satMod val="300000"/>
+              </a:schemeClr>
+            </a:gs>
+            <a:gs pos="100000">
+              <a:schemeClr val="phClr">
+                <a:shade val="30000"/>
+                <a:satMod val="200000"/>
+              </a:schemeClr>
+            </a:gs>
+          </a:gsLst>
+          <a:path path="circle">
+            <a:fillToRect l="50000" t="50000" r="50000" b="50000"/>
+          </a:path>
         </a:gradFill>
       </a:bgFillStyleLst>
     </a:fmtScheme>
   </a:themeElements>
   <a:objectDefaults/>
   <a:extraClrSchemeLst/>
-  <a:extLst>
-    <a:ext uri="{05A4C25C-085E-4340-85A3-A5531E510DB2}">
-      <thm15:themeFamily xmlns:thm15="http://schemas.microsoft.com/office/thememl/2012/main" xmlns="" name="Office Theme" id="{62F939B6-93AF-4DB8-9C6B-D6C7DFDC589F}" vid="{4A3C46E8-61CC-4603-A589-7422A47A8E4A}"/>
-    </a:ext>
-  </a:extLst>
 </a:theme>
 </file>
 
@@ -5007,7 +6592,7 @@
   <a:extraClrSchemeLst/>
   <a:extLst>
     <a:ext uri="{05A4C25C-085E-4340-85A3-A5531E510DB2}">
-      <thm15:themeFamily xmlns:thm15="http://schemas.microsoft.com/office/thememl/2012/main" xmlns="" name="Office Theme" id="{62F939B6-93AF-4DB8-9C6B-D6C7DFDC589F}" vid="{4A3C46E8-61CC-4603-A589-7422A47A8E4A}"/>
+      <thm15:themeFamily xmlns="" xmlns:thm15="http://schemas.microsoft.com/office/thememl/2012/main" name="Office Theme" id="{62F939B6-93AF-4DB8-9C6B-D6C7DFDC589F}" vid="{4A3C46E8-61CC-4603-A589-7422A47A8E4A}"/>
     </a:ext>
   </a:extLst>
 </a:theme>

</xml_diff>